<commit_message>
Added lab assignment #1
</commit_message>
<xml_diff>
--- a/Python Data Science For Fun And Profit.pptx
+++ b/Python Data Science For Fun And Profit.pptx
@@ -18,15 +18,17 @@
     <p:sldId id="266" r:id="rId12"/>
     <p:sldId id="267" r:id="rId13"/>
     <p:sldId id="268" r:id="rId14"/>
-    <p:sldId id="269" r:id="rId15"/>
-    <p:sldId id="270" r:id="rId16"/>
-    <p:sldId id="271" r:id="rId17"/>
-    <p:sldId id="272" r:id="rId18"/>
-    <p:sldId id="273" r:id="rId19"/>
-    <p:sldId id="274" r:id="rId20"/>
-    <p:sldId id="275" r:id="rId21"/>
-    <p:sldId id="276" r:id="rId22"/>
-    <p:sldId id="277" r:id="rId23"/>
+    <p:sldId id="278" r:id="rId15"/>
+    <p:sldId id="279" r:id="rId16"/>
+    <p:sldId id="269" r:id="rId17"/>
+    <p:sldId id="270" r:id="rId18"/>
+    <p:sldId id="271" r:id="rId19"/>
+    <p:sldId id="272" r:id="rId20"/>
+    <p:sldId id="273" r:id="rId21"/>
+    <p:sldId id="274" r:id="rId22"/>
+    <p:sldId id="275" r:id="rId23"/>
+    <p:sldId id="276" r:id="rId24"/>
+    <p:sldId id="277" r:id="rId25"/>
   </p:sldIdLst>
   <p:sldSz cx="12192000" cy="6858000"/>
   <p:notesSz cx="6858000" cy="9144000"/>
@@ -131,6 +133,996 @@
     </p:ext>
   </p:extLst>
 </p:presentation>
+</file>
+
+<file path=ppt/charts/chart1.xml><?xml version="1.0" encoding="utf-8"?>
+<c:chartSpace xmlns:c="http://schemas.openxmlformats.org/drawingml/2006/chart" xmlns:a="http://schemas.openxmlformats.org/drawingml/2006/main" xmlns:r="http://schemas.openxmlformats.org/officeDocument/2006/relationships" xmlns:c16r2="http://schemas.microsoft.com/office/drawing/2015/06/chart">
+  <c:date1904 val="0"/>
+  <c:lang val="en-US"/>
+  <c:roundedCorners val="0"/>
+  <mc:AlternateContent xmlns:mc="http://schemas.openxmlformats.org/markup-compatibility/2006">
+    <mc:Choice xmlns:c14="http://schemas.microsoft.com/office/drawing/2007/8/2/chart" Requires="c14">
+      <c14:style val="102"/>
+    </mc:Choice>
+    <mc:Fallback>
+      <c:style val="2"/>
+    </mc:Fallback>
+  </mc:AlternateContent>
+  <c:chart>
+    <c:autoTitleDeleted val="1"/>
+    <c:plotArea>
+      <c:layout>
+        <c:manualLayout>
+          <c:layoutTarget val="inner"/>
+          <c:xMode val="edge"/>
+          <c:yMode val="edge"/>
+          <c:x val="0.1170883932496619"/>
+          <c:y val="9.4671423465269591E-2"/>
+          <c:w val="0.84693322262533011"/>
+          <c:h val="0.77902114213508888"/>
+        </c:manualLayout>
+      </c:layout>
+      <c:barChart>
+        <c:barDir val="col"/>
+        <c:grouping val="clustered"/>
+        <c:varyColors val="0"/>
+        <c:ser>
+          <c:idx val="0"/>
+          <c:order val="0"/>
+          <c:tx>
+            <c:strRef>
+              <c:f>Sheet1!$B$1</c:f>
+              <c:strCache>
+                <c:ptCount val="1"/>
+                <c:pt idx="0">
+                  <c:v>2017</c:v>
+                </c:pt>
+              </c:strCache>
+            </c:strRef>
+          </c:tx>
+          <c:spPr>
+            <a:solidFill>
+              <a:schemeClr val="accent1"/>
+            </a:solidFill>
+            <a:ln>
+              <a:noFill/>
+            </a:ln>
+            <a:effectLst/>
+          </c:spPr>
+          <c:invertIfNegative val="0"/>
+          <c:cat>
+            <c:strRef>
+              <c:f>Sheet1!$A$2:$A$5</c:f>
+              <c:strCache>
+                <c:ptCount val="4"/>
+                <c:pt idx="0">
+                  <c:v>Q1</c:v>
+                </c:pt>
+                <c:pt idx="1">
+                  <c:v>Q2</c:v>
+                </c:pt>
+                <c:pt idx="2">
+                  <c:v>Q3</c:v>
+                </c:pt>
+                <c:pt idx="3">
+                  <c:v>Q4</c:v>
+                </c:pt>
+              </c:strCache>
+            </c:strRef>
+          </c:cat>
+          <c:val>
+            <c:numRef>
+              <c:f>Sheet1!$B$2:$B$5</c:f>
+              <c:numCache>
+                <c:formatCode>General</c:formatCode>
+                <c:ptCount val="4"/>
+                <c:pt idx="0">
+                  <c:v>425</c:v>
+                </c:pt>
+                <c:pt idx="1">
+                  <c:v>366</c:v>
+                </c:pt>
+                <c:pt idx="2">
+                  <c:v>498</c:v>
+                </c:pt>
+                <c:pt idx="3">
+                  <c:v>403</c:v>
+                </c:pt>
+              </c:numCache>
+            </c:numRef>
+          </c:val>
+          <c:extLst>
+            <c:ext xmlns:c16="http://schemas.microsoft.com/office/drawing/2014/chart" uri="{C3380CC4-5D6E-409C-BE32-E72D297353CC}">
+              <c16:uniqueId val="{00000000-0DBC-4DAC-A0D1-E74C2CB097A3}"/>
+            </c:ext>
+          </c:extLst>
+        </c:ser>
+        <c:ser>
+          <c:idx val="1"/>
+          <c:order val="1"/>
+          <c:tx>
+            <c:strRef>
+              <c:f>Sheet1!$C$1</c:f>
+              <c:strCache>
+                <c:ptCount val="1"/>
+                <c:pt idx="0">
+                  <c:v>2018</c:v>
+                </c:pt>
+              </c:strCache>
+            </c:strRef>
+          </c:tx>
+          <c:spPr>
+            <a:solidFill>
+              <a:schemeClr val="accent2"/>
+            </a:solidFill>
+            <a:ln>
+              <a:noFill/>
+            </a:ln>
+            <a:effectLst/>
+          </c:spPr>
+          <c:invertIfNegative val="0"/>
+          <c:cat>
+            <c:strRef>
+              <c:f>Sheet1!$A$2:$A$5</c:f>
+              <c:strCache>
+                <c:ptCount val="4"/>
+                <c:pt idx="0">
+                  <c:v>Q1</c:v>
+                </c:pt>
+                <c:pt idx="1">
+                  <c:v>Q2</c:v>
+                </c:pt>
+                <c:pt idx="2">
+                  <c:v>Q3</c:v>
+                </c:pt>
+                <c:pt idx="3">
+                  <c:v>Q4</c:v>
+                </c:pt>
+              </c:strCache>
+            </c:strRef>
+          </c:cat>
+          <c:val>
+            <c:numRef>
+              <c:f>Sheet1!$C$2:$C$5</c:f>
+              <c:numCache>
+                <c:formatCode>General</c:formatCode>
+                <c:ptCount val="4"/>
+                <c:pt idx="0">
+                  <c:v>486</c:v>
+                </c:pt>
+                <c:pt idx="1">
+                  <c:v>385</c:v>
+                </c:pt>
+                <c:pt idx="2">
+                  <c:v>546</c:v>
+                </c:pt>
+                <c:pt idx="3">
+                  <c:v>432</c:v>
+                </c:pt>
+              </c:numCache>
+            </c:numRef>
+          </c:val>
+          <c:extLst>
+            <c:ext xmlns:c16="http://schemas.microsoft.com/office/drawing/2014/chart" uri="{C3380CC4-5D6E-409C-BE32-E72D297353CC}">
+              <c16:uniqueId val="{00000001-0DBC-4DAC-A0D1-E74C2CB097A3}"/>
+            </c:ext>
+          </c:extLst>
+        </c:ser>
+        <c:ser>
+          <c:idx val="2"/>
+          <c:order val="2"/>
+          <c:tx>
+            <c:strRef>
+              <c:f>Sheet1!$D$1</c:f>
+              <c:strCache>
+                <c:ptCount val="1"/>
+                <c:pt idx="0">
+                  <c:v>2019</c:v>
+                </c:pt>
+              </c:strCache>
+            </c:strRef>
+          </c:tx>
+          <c:spPr>
+            <a:solidFill>
+              <a:schemeClr val="accent3"/>
+            </a:solidFill>
+            <a:ln>
+              <a:noFill/>
+            </a:ln>
+            <a:effectLst/>
+          </c:spPr>
+          <c:invertIfNegative val="0"/>
+          <c:cat>
+            <c:strRef>
+              <c:f>Sheet1!$A$2:$A$5</c:f>
+              <c:strCache>
+                <c:ptCount val="4"/>
+                <c:pt idx="0">
+                  <c:v>Q1</c:v>
+                </c:pt>
+                <c:pt idx="1">
+                  <c:v>Q2</c:v>
+                </c:pt>
+                <c:pt idx="2">
+                  <c:v>Q3</c:v>
+                </c:pt>
+                <c:pt idx="3">
+                  <c:v>Q4</c:v>
+                </c:pt>
+              </c:strCache>
+            </c:strRef>
+          </c:cat>
+          <c:val>
+            <c:numRef>
+              <c:f>Sheet1!$D$2:$D$5</c:f>
+              <c:numCache>
+                <c:formatCode>General</c:formatCode>
+                <c:ptCount val="4"/>
+                <c:pt idx="0">
+                  <c:v>474</c:v>
+                </c:pt>
+                <c:pt idx="1">
+                  <c:v>390</c:v>
+                </c:pt>
+                <c:pt idx="2">
+                  <c:v>538</c:v>
+                </c:pt>
+                <c:pt idx="3">
+                  <c:v>412</c:v>
+                </c:pt>
+              </c:numCache>
+            </c:numRef>
+          </c:val>
+          <c:extLst>
+            <c:ext xmlns:c16="http://schemas.microsoft.com/office/drawing/2014/chart" uri="{C3380CC4-5D6E-409C-BE32-E72D297353CC}">
+              <c16:uniqueId val="{00000002-0DBC-4DAC-A0D1-E74C2CB097A3}"/>
+            </c:ext>
+          </c:extLst>
+        </c:ser>
+        <c:dLbls>
+          <c:showLegendKey val="0"/>
+          <c:showVal val="0"/>
+          <c:showCatName val="0"/>
+          <c:showSerName val="0"/>
+          <c:showPercent val="0"/>
+          <c:showBubbleSize val="0"/>
+        </c:dLbls>
+        <c:gapWidth val="219"/>
+        <c:overlap val="-27"/>
+        <c:axId val="324186271"/>
+        <c:axId val="324033279"/>
+      </c:barChart>
+      <c:catAx>
+        <c:axId val="324186271"/>
+        <c:scaling>
+          <c:orientation val="minMax"/>
+        </c:scaling>
+        <c:delete val="0"/>
+        <c:axPos val="b"/>
+        <c:numFmt formatCode="General" sourceLinked="1"/>
+        <c:majorTickMark val="none"/>
+        <c:minorTickMark val="none"/>
+        <c:tickLblPos val="nextTo"/>
+        <c:spPr>
+          <a:noFill/>
+          <a:ln w="9525" cap="flat" cmpd="sng" algn="ctr">
+            <a:solidFill>
+              <a:schemeClr val="tx1">
+                <a:lumMod val="15000"/>
+                <a:lumOff val="85000"/>
+              </a:schemeClr>
+            </a:solidFill>
+            <a:round/>
+          </a:ln>
+          <a:effectLst/>
+        </c:spPr>
+        <c:txPr>
+          <a:bodyPr rot="-60000000" spcFirstLastPara="1" vertOverflow="ellipsis" vert="horz" wrap="square" anchor="ctr" anchorCtr="1"/>
+          <a:lstStyle/>
+          <a:p>
+            <a:pPr>
+              <a:defRPr sz="1197" b="0" i="0" u="none" strike="noStrike" kern="1200" baseline="0">
+                <a:solidFill>
+                  <a:schemeClr val="tx1">
+                    <a:lumMod val="65000"/>
+                    <a:lumOff val="35000"/>
+                  </a:schemeClr>
+                </a:solidFill>
+                <a:latin typeface="+mn-lt"/>
+                <a:ea typeface="+mn-ea"/>
+                <a:cs typeface="+mn-cs"/>
+              </a:defRPr>
+            </a:pPr>
+            <a:endParaRPr lang="en-US"/>
+          </a:p>
+        </c:txPr>
+        <c:crossAx val="324033279"/>
+        <c:crosses val="autoZero"/>
+        <c:auto val="1"/>
+        <c:lblAlgn val="ctr"/>
+        <c:lblOffset val="100"/>
+        <c:noMultiLvlLbl val="0"/>
+      </c:catAx>
+      <c:valAx>
+        <c:axId val="324033279"/>
+        <c:scaling>
+          <c:orientation val="minMax"/>
+        </c:scaling>
+        <c:delete val="0"/>
+        <c:axPos val="l"/>
+        <c:majorGridlines>
+          <c:spPr>
+            <a:ln w="9525" cap="flat" cmpd="sng" algn="ctr">
+              <a:solidFill>
+                <a:schemeClr val="tx1">
+                  <a:lumMod val="15000"/>
+                  <a:lumOff val="85000"/>
+                </a:schemeClr>
+              </a:solidFill>
+              <a:round/>
+            </a:ln>
+            <a:effectLst/>
+          </c:spPr>
+        </c:majorGridlines>
+        <c:numFmt formatCode="General" sourceLinked="1"/>
+        <c:majorTickMark val="none"/>
+        <c:minorTickMark val="none"/>
+        <c:tickLblPos val="nextTo"/>
+        <c:spPr>
+          <a:noFill/>
+          <a:ln>
+            <a:noFill/>
+          </a:ln>
+          <a:effectLst/>
+        </c:spPr>
+        <c:txPr>
+          <a:bodyPr rot="-60000000" spcFirstLastPara="1" vertOverflow="ellipsis" vert="horz" wrap="square" anchor="ctr" anchorCtr="1"/>
+          <a:lstStyle/>
+          <a:p>
+            <a:pPr>
+              <a:defRPr sz="1197" b="0" i="0" u="none" strike="noStrike" kern="1200" baseline="0">
+                <a:solidFill>
+                  <a:schemeClr val="tx1">
+                    <a:lumMod val="65000"/>
+                    <a:lumOff val="35000"/>
+                  </a:schemeClr>
+                </a:solidFill>
+                <a:latin typeface="+mn-lt"/>
+                <a:ea typeface="+mn-ea"/>
+                <a:cs typeface="+mn-cs"/>
+              </a:defRPr>
+            </a:pPr>
+            <a:endParaRPr lang="en-US"/>
+          </a:p>
+        </c:txPr>
+        <c:crossAx val="324186271"/>
+        <c:crosses val="autoZero"/>
+        <c:crossBetween val="between"/>
+      </c:valAx>
+      <c:spPr>
+        <a:noFill/>
+        <a:ln>
+          <a:noFill/>
+        </a:ln>
+        <a:effectLst/>
+      </c:spPr>
+    </c:plotArea>
+    <c:legend>
+      <c:legendPos val="b"/>
+      <c:layout>
+        <c:manualLayout>
+          <c:xMode val="edge"/>
+          <c:yMode val="edge"/>
+          <c:x val="0.77037240589283196"/>
+          <c:y val="3.8505233093759389E-2"/>
+          <c:w val="0.2115304926463222"/>
+          <c:h val="0.26886707757262313"/>
+        </c:manualLayout>
+      </c:layout>
+      <c:overlay val="0"/>
+      <c:spPr>
+        <a:noFill/>
+        <a:ln>
+          <a:noFill/>
+        </a:ln>
+        <a:effectLst/>
+      </c:spPr>
+      <c:txPr>
+        <a:bodyPr rot="0" spcFirstLastPara="1" vertOverflow="ellipsis" vert="horz" wrap="square" anchor="ctr" anchorCtr="1"/>
+        <a:lstStyle/>
+        <a:p>
+          <a:pPr>
+            <a:defRPr sz="1197" b="0" i="0" u="none" strike="noStrike" kern="1200" baseline="0">
+              <a:solidFill>
+                <a:schemeClr val="tx1">
+                  <a:lumMod val="65000"/>
+                  <a:lumOff val="35000"/>
+                </a:schemeClr>
+              </a:solidFill>
+              <a:latin typeface="+mn-lt"/>
+              <a:ea typeface="+mn-ea"/>
+              <a:cs typeface="+mn-cs"/>
+            </a:defRPr>
+          </a:pPr>
+          <a:endParaRPr lang="en-US"/>
+        </a:p>
+      </c:txPr>
+    </c:legend>
+    <c:plotVisOnly val="1"/>
+    <c:dispBlanksAs val="gap"/>
+    <c:extLst>
+      <c:ext xmlns:c16r3="http://schemas.microsoft.com/office/drawing/2017/03/chart" uri="{56B9EC1D-385E-4148-901F-78D8002777C0}">
+        <c16r3:dataDisplayOptions16>
+          <c16r3:dispNaAsBlank val="1"/>
+        </c16r3:dataDisplayOptions16>
+      </c:ext>
+    </c:extLst>
+    <c:showDLblsOverMax val="0"/>
+  </c:chart>
+  <c:spPr>
+    <a:noFill/>
+    <a:ln>
+      <a:noFill/>
+    </a:ln>
+    <a:effectLst/>
+  </c:spPr>
+  <c:txPr>
+    <a:bodyPr/>
+    <a:lstStyle/>
+    <a:p>
+      <a:pPr>
+        <a:defRPr/>
+      </a:pPr>
+      <a:endParaRPr lang="en-US"/>
+    </a:p>
+  </c:txPr>
+  <c:externalData r:id="rId3">
+    <c:autoUpdate val="0"/>
+  </c:externalData>
+</c:chartSpace>
+</file>
+
+<file path=ppt/charts/colors1.xml><?xml version="1.0" encoding="utf-8"?>
+<cs:colorStyle xmlns:cs="http://schemas.microsoft.com/office/drawing/2012/chartStyle" xmlns:a="http://schemas.openxmlformats.org/drawingml/2006/main" meth="cycle" id="10">
+  <a:schemeClr val="accent1"/>
+  <a:schemeClr val="accent2"/>
+  <a:schemeClr val="accent3"/>
+  <a:schemeClr val="accent4"/>
+  <a:schemeClr val="accent5"/>
+  <a:schemeClr val="accent6"/>
+  <cs:variation/>
+  <cs:variation>
+    <a:lumMod val="60000"/>
+  </cs:variation>
+  <cs:variation>
+    <a:lumMod val="80000"/>
+    <a:lumOff val="20000"/>
+  </cs:variation>
+  <cs:variation>
+    <a:lumMod val="80000"/>
+  </cs:variation>
+  <cs:variation>
+    <a:lumMod val="60000"/>
+    <a:lumOff val="40000"/>
+  </cs:variation>
+  <cs:variation>
+    <a:lumMod val="50000"/>
+  </cs:variation>
+  <cs:variation>
+    <a:lumMod val="70000"/>
+    <a:lumOff val="30000"/>
+  </cs:variation>
+  <cs:variation>
+    <a:lumMod val="70000"/>
+  </cs:variation>
+  <cs:variation>
+    <a:lumMod val="50000"/>
+    <a:lumOff val="50000"/>
+  </cs:variation>
+</cs:colorStyle>
+</file>
+
+<file path=ppt/charts/style1.xml><?xml version="1.0" encoding="utf-8"?>
+<cs:chartStyle xmlns:cs="http://schemas.microsoft.com/office/drawing/2012/chartStyle" xmlns:a="http://schemas.openxmlformats.org/drawingml/2006/main" id="201">
+  <cs:axisTitle>
+    <cs:lnRef idx="0"/>
+    <cs:fillRef idx="0"/>
+    <cs:effectRef idx="0"/>
+    <cs:fontRef idx="minor">
+      <a:schemeClr val="tx1">
+        <a:lumMod val="65000"/>
+        <a:lumOff val="35000"/>
+      </a:schemeClr>
+    </cs:fontRef>
+    <cs:defRPr sz="1330" kern="1200"/>
+  </cs:axisTitle>
+  <cs:categoryAxis>
+    <cs:lnRef idx="0"/>
+    <cs:fillRef idx="0"/>
+    <cs:effectRef idx="0"/>
+    <cs:fontRef idx="minor">
+      <a:schemeClr val="tx1">
+        <a:lumMod val="65000"/>
+        <a:lumOff val="35000"/>
+      </a:schemeClr>
+    </cs:fontRef>
+    <cs:spPr>
+      <a:ln w="9525" cap="flat" cmpd="sng" algn="ctr">
+        <a:solidFill>
+          <a:schemeClr val="tx1">
+            <a:lumMod val="15000"/>
+            <a:lumOff val="85000"/>
+          </a:schemeClr>
+        </a:solidFill>
+        <a:round/>
+      </a:ln>
+    </cs:spPr>
+    <cs:defRPr sz="1197" kern="1200"/>
+  </cs:categoryAxis>
+  <cs:chartArea mods="allowNoFillOverride allowNoLineOverride">
+    <cs:lnRef idx="0"/>
+    <cs:fillRef idx="0"/>
+    <cs:effectRef idx="0"/>
+    <cs:fontRef idx="minor">
+      <a:schemeClr val="tx1"/>
+    </cs:fontRef>
+    <cs:spPr>
+      <a:solidFill>
+        <a:schemeClr val="bg1"/>
+      </a:solidFill>
+      <a:ln w="9525" cap="flat" cmpd="sng" algn="ctr">
+        <a:solidFill>
+          <a:schemeClr val="tx1">
+            <a:lumMod val="15000"/>
+            <a:lumOff val="85000"/>
+          </a:schemeClr>
+        </a:solidFill>
+        <a:round/>
+      </a:ln>
+    </cs:spPr>
+    <cs:defRPr sz="1330" kern="1200"/>
+  </cs:chartArea>
+  <cs:dataLabel>
+    <cs:lnRef idx="0"/>
+    <cs:fillRef idx="0"/>
+    <cs:effectRef idx="0"/>
+    <cs:fontRef idx="minor">
+      <a:schemeClr val="tx1">
+        <a:lumMod val="75000"/>
+        <a:lumOff val="25000"/>
+      </a:schemeClr>
+    </cs:fontRef>
+    <cs:defRPr sz="1197" kern="1200"/>
+  </cs:dataLabel>
+  <cs:dataLabelCallout>
+    <cs:lnRef idx="0"/>
+    <cs:fillRef idx="0"/>
+    <cs:effectRef idx="0"/>
+    <cs:fontRef idx="minor">
+      <a:schemeClr val="dk1">
+        <a:lumMod val="65000"/>
+        <a:lumOff val="35000"/>
+      </a:schemeClr>
+    </cs:fontRef>
+    <cs:spPr>
+      <a:solidFill>
+        <a:schemeClr val="lt1"/>
+      </a:solidFill>
+      <a:ln>
+        <a:solidFill>
+          <a:schemeClr val="dk1">
+            <a:lumMod val="25000"/>
+            <a:lumOff val="75000"/>
+          </a:schemeClr>
+        </a:solidFill>
+      </a:ln>
+    </cs:spPr>
+    <cs:defRPr sz="1197" kern="1200"/>
+    <cs:bodyPr rot="0" spcFirstLastPara="1" vertOverflow="clip" horzOverflow="clip" vert="horz" wrap="square" lIns="36576" tIns="18288" rIns="36576" bIns="18288" anchor="ctr" anchorCtr="1">
+      <a:spAutoFit/>
+    </cs:bodyPr>
+  </cs:dataLabelCallout>
+  <cs:dataPoint>
+    <cs:lnRef idx="0"/>
+    <cs:fillRef idx="1">
+      <cs:styleClr val="auto"/>
+    </cs:fillRef>
+    <cs:effectRef idx="0"/>
+    <cs:fontRef idx="minor">
+      <a:schemeClr val="tx1"/>
+    </cs:fontRef>
+  </cs:dataPoint>
+  <cs:dataPoint3D>
+    <cs:lnRef idx="0"/>
+    <cs:fillRef idx="1">
+      <cs:styleClr val="auto"/>
+    </cs:fillRef>
+    <cs:effectRef idx="0"/>
+    <cs:fontRef idx="minor">
+      <a:schemeClr val="tx1"/>
+    </cs:fontRef>
+  </cs:dataPoint3D>
+  <cs:dataPointLine>
+    <cs:lnRef idx="0">
+      <cs:styleClr val="auto"/>
+    </cs:lnRef>
+    <cs:fillRef idx="1"/>
+    <cs:effectRef idx="0"/>
+    <cs:fontRef idx="minor">
+      <a:schemeClr val="tx1"/>
+    </cs:fontRef>
+    <cs:spPr>
+      <a:ln w="28575" cap="rnd">
+        <a:solidFill>
+          <a:schemeClr val="phClr"/>
+        </a:solidFill>
+        <a:round/>
+      </a:ln>
+    </cs:spPr>
+  </cs:dataPointLine>
+  <cs:dataPointMarker>
+    <cs:lnRef idx="0">
+      <cs:styleClr val="auto"/>
+    </cs:lnRef>
+    <cs:fillRef idx="1">
+      <cs:styleClr val="auto"/>
+    </cs:fillRef>
+    <cs:effectRef idx="0"/>
+    <cs:fontRef idx="minor">
+      <a:schemeClr val="tx1"/>
+    </cs:fontRef>
+    <cs:spPr>
+      <a:ln w="9525">
+        <a:solidFill>
+          <a:schemeClr val="phClr"/>
+        </a:solidFill>
+      </a:ln>
+    </cs:spPr>
+  </cs:dataPointMarker>
+  <cs:dataPointMarkerLayout symbol="circle" size="5"/>
+  <cs:dataPointWireframe>
+    <cs:lnRef idx="0">
+      <cs:styleClr val="auto"/>
+    </cs:lnRef>
+    <cs:fillRef idx="1"/>
+    <cs:effectRef idx="0"/>
+    <cs:fontRef idx="minor">
+      <a:schemeClr val="tx1"/>
+    </cs:fontRef>
+    <cs:spPr>
+      <a:ln w="9525" cap="rnd">
+        <a:solidFill>
+          <a:schemeClr val="phClr"/>
+        </a:solidFill>
+        <a:round/>
+      </a:ln>
+    </cs:spPr>
+  </cs:dataPointWireframe>
+  <cs:dataTable>
+    <cs:lnRef idx="0"/>
+    <cs:fillRef idx="0"/>
+    <cs:effectRef idx="0"/>
+    <cs:fontRef idx="minor">
+      <a:schemeClr val="tx1">
+        <a:lumMod val="65000"/>
+        <a:lumOff val="35000"/>
+      </a:schemeClr>
+    </cs:fontRef>
+    <cs:spPr>
+      <a:noFill/>
+      <a:ln w="9525" cap="flat" cmpd="sng" algn="ctr">
+        <a:solidFill>
+          <a:schemeClr val="tx1">
+            <a:lumMod val="15000"/>
+            <a:lumOff val="85000"/>
+          </a:schemeClr>
+        </a:solidFill>
+        <a:round/>
+      </a:ln>
+    </cs:spPr>
+    <cs:defRPr sz="1197" kern="1200"/>
+  </cs:dataTable>
+  <cs:downBar>
+    <cs:lnRef idx="0"/>
+    <cs:fillRef idx="0"/>
+    <cs:effectRef idx="0"/>
+    <cs:fontRef idx="minor">
+      <a:schemeClr val="dk1"/>
+    </cs:fontRef>
+    <cs:spPr>
+      <a:solidFill>
+        <a:schemeClr val="dk1">
+          <a:lumMod val="65000"/>
+          <a:lumOff val="35000"/>
+        </a:schemeClr>
+      </a:solidFill>
+      <a:ln w="9525">
+        <a:solidFill>
+          <a:schemeClr val="tx1">
+            <a:lumMod val="65000"/>
+            <a:lumOff val="35000"/>
+          </a:schemeClr>
+        </a:solidFill>
+      </a:ln>
+    </cs:spPr>
+  </cs:downBar>
+  <cs:dropLine>
+    <cs:lnRef idx="0"/>
+    <cs:fillRef idx="0"/>
+    <cs:effectRef idx="0"/>
+    <cs:fontRef idx="minor">
+      <a:schemeClr val="tx1"/>
+    </cs:fontRef>
+    <cs:spPr>
+      <a:ln w="9525" cap="flat" cmpd="sng" algn="ctr">
+        <a:solidFill>
+          <a:schemeClr val="tx1">
+            <a:lumMod val="35000"/>
+            <a:lumOff val="65000"/>
+          </a:schemeClr>
+        </a:solidFill>
+        <a:round/>
+      </a:ln>
+    </cs:spPr>
+  </cs:dropLine>
+  <cs:errorBar>
+    <cs:lnRef idx="0"/>
+    <cs:fillRef idx="0"/>
+    <cs:effectRef idx="0"/>
+    <cs:fontRef idx="minor">
+      <a:schemeClr val="tx1"/>
+    </cs:fontRef>
+    <cs:spPr>
+      <a:ln w="9525" cap="flat" cmpd="sng" algn="ctr">
+        <a:solidFill>
+          <a:schemeClr val="tx1">
+            <a:lumMod val="65000"/>
+            <a:lumOff val="35000"/>
+          </a:schemeClr>
+        </a:solidFill>
+        <a:round/>
+      </a:ln>
+    </cs:spPr>
+  </cs:errorBar>
+  <cs:floor>
+    <cs:lnRef idx="0"/>
+    <cs:fillRef idx="0"/>
+    <cs:effectRef idx="0"/>
+    <cs:fontRef idx="minor">
+      <a:schemeClr val="tx1"/>
+    </cs:fontRef>
+    <cs:spPr>
+      <a:noFill/>
+      <a:ln>
+        <a:noFill/>
+      </a:ln>
+    </cs:spPr>
+  </cs:floor>
+  <cs:gridlineMajor>
+    <cs:lnRef idx="0"/>
+    <cs:fillRef idx="0"/>
+    <cs:effectRef idx="0"/>
+    <cs:fontRef idx="minor">
+      <a:schemeClr val="tx1"/>
+    </cs:fontRef>
+    <cs:spPr>
+      <a:ln w="9525" cap="flat" cmpd="sng" algn="ctr">
+        <a:solidFill>
+          <a:schemeClr val="tx1">
+            <a:lumMod val="15000"/>
+            <a:lumOff val="85000"/>
+          </a:schemeClr>
+        </a:solidFill>
+        <a:round/>
+      </a:ln>
+    </cs:spPr>
+  </cs:gridlineMajor>
+  <cs:gridlineMinor>
+    <cs:lnRef idx="0"/>
+    <cs:fillRef idx="0"/>
+    <cs:effectRef idx="0"/>
+    <cs:fontRef idx="minor">
+      <a:schemeClr val="tx1"/>
+    </cs:fontRef>
+    <cs:spPr>
+      <a:ln w="9525" cap="flat" cmpd="sng" algn="ctr">
+        <a:solidFill>
+          <a:schemeClr val="tx1">
+            <a:lumMod val="5000"/>
+            <a:lumOff val="95000"/>
+          </a:schemeClr>
+        </a:solidFill>
+        <a:round/>
+      </a:ln>
+    </cs:spPr>
+  </cs:gridlineMinor>
+  <cs:hiLoLine>
+    <cs:lnRef idx="0"/>
+    <cs:fillRef idx="0"/>
+    <cs:effectRef idx="0"/>
+    <cs:fontRef idx="minor">
+      <a:schemeClr val="tx1"/>
+    </cs:fontRef>
+    <cs:spPr>
+      <a:ln w="9525" cap="flat" cmpd="sng" algn="ctr">
+        <a:solidFill>
+          <a:schemeClr val="tx1">
+            <a:lumMod val="75000"/>
+            <a:lumOff val="25000"/>
+          </a:schemeClr>
+        </a:solidFill>
+        <a:round/>
+      </a:ln>
+    </cs:spPr>
+  </cs:hiLoLine>
+  <cs:leaderLine>
+    <cs:lnRef idx="0"/>
+    <cs:fillRef idx="0"/>
+    <cs:effectRef idx="0"/>
+    <cs:fontRef idx="minor">
+      <a:schemeClr val="tx1"/>
+    </cs:fontRef>
+    <cs:spPr>
+      <a:ln w="9525" cap="flat" cmpd="sng" algn="ctr">
+        <a:solidFill>
+          <a:schemeClr val="tx1">
+            <a:lumMod val="35000"/>
+            <a:lumOff val="65000"/>
+          </a:schemeClr>
+        </a:solidFill>
+        <a:round/>
+      </a:ln>
+    </cs:spPr>
+  </cs:leaderLine>
+  <cs:legend>
+    <cs:lnRef idx="0"/>
+    <cs:fillRef idx="0"/>
+    <cs:effectRef idx="0"/>
+    <cs:fontRef idx="minor">
+      <a:schemeClr val="tx1">
+        <a:lumMod val="65000"/>
+        <a:lumOff val="35000"/>
+      </a:schemeClr>
+    </cs:fontRef>
+    <cs:defRPr sz="1197" kern="1200"/>
+  </cs:legend>
+  <cs:plotArea mods="allowNoFillOverride allowNoLineOverride">
+    <cs:lnRef idx="0"/>
+    <cs:fillRef idx="0"/>
+    <cs:effectRef idx="0"/>
+    <cs:fontRef idx="minor">
+      <a:schemeClr val="tx1"/>
+    </cs:fontRef>
+  </cs:plotArea>
+  <cs:plotArea3D mods="allowNoFillOverride allowNoLineOverride">
+    <cs:lnRef idx="0"/>
+    <cs:fillRef idx="0"/>
+    <cs:effectRef idx="0"/>
+    <cs:fontRef idx="minor">
+      <a:schemeClr val="tx1"/>
+    </cs:fontRef>
+  </cs:plotArea3D>
+  <cs:seriesAxis>
+    <cs:lnRef idx="0"/>
+    <cs:fillRef idx="0"/>
+    <cs:effectRef idx="0"/>
+    <cs:fontRef idx="minor">
+      <a:schemeClr val="tx1">
+        <a:lumMod val="65000"/>
+        <a:lumOff val="35000"/>
+      </a:schemeClr>
+    </cs:fontRef>
+    <cs:defRPr sz="1197" kern="1200"/>
+  </cs:seriesAxis>
+  <cs:seriesLine>
+    <cs:lnRef idx="0"/>
+    <cs:fillRef idx="0"/>
+    <cs:effectRef idx="0"/>
+    <cs:fontRef idx="minor">
+      <a:schemeClr val="tx1"/>
+    </cs:fontRef>
+    <cs:spPr>
+      <a:ln w="9525" cap="flat" cmpd="sng" algn="ctr">
+        <a:solidFill>
+          <a:schemeClr val="tx1">
+            <a:lumMod val="35000"/>
+            <a:lumOff val="65000"/>
+          </a:schemeClr>
+        </a:solidFill>
+        <a:round/>
+      </a:ln>
+    </cs:spPr>
+  </cs:seriesLine>
+  <cs:title>
+    <cs:lnRef idx="0"/>
+    <cs:fillRef idx="0"/>
+    <cs:effectRef idx="0"/>
+    <cs:fontRef idx="minor">
+      <a:schemeClr val="tx1">
+        <a:lumMod val="65000"/>
+        <a:lumOff val="35000"/>
+      </a:schemeClr>
+    </cs:fontRef>
+    <cs:defRPr sz="1862" b="0" kern="1200" spc="0" baseline="0"/>
+  </cs:title>
+  <cs:trendline>
+    <cs:lnRef idx="0">
+      <cs:styleClr val="auto"/>
+    </cs:lnRef>
+    <cs:fillRef idx="0"/>
+    <cs:effectRef idx="0"/>
+    <cs:fontRef idx="minor">
+      <a:schemeClr val="tx1"/>
+    </cs:fontRef>
+    <cs:spPr>
+      <a:ln w="19050" cap="rnd">
+        <a:solidFill>
+          <a:schemeClr val="phClr"/>
+        </a:solidFill>
+        <a:prstDash val="sysDot"/>
+      </a:ln>
+    </cs:spPr>
+  </cs:trendline>
+  <cs:trendlineLabel>
+    <cs:lnRef idx="0"/>
+    <cs:fillRef idx="0"/>
+    <cs:effectRef idx="0"/>
+    <cs:fontRef idx="minor">
+      <a:schemeClr val="tx1">
+        <a:lumMod val="65000"/>
+        <a:lumOff val="35000"/>
+      </a:schemeClr>
+    </cs:fontRef>
+    <cs:defRPr sz="1197" kern="1200"/>
+  </cs:trendlineLabel>
+  <cs:upBar>
+    <cs:lnRef idx="0"/>
+    <cs:fillRef idx="0"/>
+    <cs:effectRef idx="0"/>
+    <cs:fontRef idx="minor">
+      <a:schemeClr val="dk1"/>
+    </cs:fontRef>
+    <cs:spPr>
+      <a:solidFill>
+        <a:schemeClr val="lt1"/>
+      </a:solidFill>
+      <a:ln w="9525">
+        <a:solidFill>
+          <a:schemeClr val="tx1">
+            <a:lumMod val="15000"/>
+            <a:lumOff val="85000"/>
+          </a:schemeClr>
+        </a:solidFill>
+      </a:ln>
+    </cs:spPr>
+  </cs:upBar>
+  <cs:valueAxis>
+    <cs:lnRef idx="0"/>
+    <cs:fillRef idx="0"/>
+    <cs:effectRef idx="0"/>
+    <cs:fontRef idx="minor">
+      <a:schemeClr val="tx1">
+        <a:lumMod val="65000"/>
+        <a:lumOff val="35000"/>
+      </a:schemeClr>
+    </cs:fontRef>
+    <cs:defRPr sz="1197" kern="1200"/>
+  </cs:valueAxis>
+  <cs:wall>
+    <cs:lnRef idx="0"/>
+    <cs:fillRef idx="0"/>
+    <cs:effectRef idx="0"/>
+    <cs:fontRef idx="minor">
+      <a:schemeClr val="tx1"/>
+    </cs:fontRef>
+    <cs:spPr>
+      <a:noFill/>
+      <a:ln>
+        <a:noFill/>
+      </a:ln>
+    </cs:spPr>
+  </cs:wall>
+</cs:chartStyle>
 </file>
 
 <file path=ppt/diagrams/colors1.xml><?xml version="1.0" encoding="utf-8"?>
@@ -3830,7 +4822,7 @@
           <a:p>
             <a:fld id="{163D8D13-7DED-4514-BE8C-9C8D0FD9F0B8}" type="datetimeFigureOut">
               <a:rPr lang="en-US" smtClean="0"/>
-              <a:t>12/1/2019</a:t>
+              <a:t>12/4/2019</a:t>
             </a:fld>
             <a:endParaRPr lang="en-US"/>
           </a:p>
@@ -4028,7 +5020,7 @@
           <a:p>
             <a:fld id="{163D8D13-7DED-4514-BE8C-9C8D0FD9F0B8}" type="datetimeFigureOut">
               <a:rPr lang="en-US" smtClean="0"/>
-              <a:t>12/1/2019</a:t>
+              <a:t>12/4/2019</a:t>
             </a:fld>
             <a:endParaRPr lang="en-US"/>
           </a:p>
@@ -4236,7 +5228,7 @@
           <a:p>
             <a:fld id="{163D8D13-7DED-4514-BE8C-9C8D0FD9F0B8}" type="datetimeFigureOut">
               <a:rPr lang="en-US" smtClean="0"/>
-              <a:t>12/1/2019</a:t>
+              <a:t>12/4/2019</a:t>
             </a:fld>
             <a:endParaRPr lang="en-US"/>
           </a:p>
@@ -4434,7 +5426,7 @@
           <a:p>
             <a:fld id="{163D8D13-7DED-4514-BE8C-9C8D0FD9F0B8}" type="datetimeFigureOut">
               <a:rPr lang="en-US" smtClean="0"/>
-              <a:t>12/1/2019</a:t>
+              <a:t>12/4/2019</a:t>
             </a:fld>
             <a:endParaRPr lang="en-US"/>
           </a:p>
@@ -4709,7 +5701,7 @@
           <a:p>
             <a:fld id="{163D8D13-7DED-4514-BE8C-9C8D0FD9F0B8}" type="datetimeFigureOut">
               <a:rPr lang="en-US" smtClean="0"/>
-              <a:t>12/1/2019</a:t>
+              <a:t>12/4/2019</a:t>
             </a:fld>
             <a:endParaRPr lang="en-US"/>
           </a:p>
@@ -4974,7 +5966,7 @@
           <a:p>
             <a:fld id="{163D8D13-7DED-4514-BE8C-9C8D0FD9F0B8}" type="datetimeFigureOut">
               <a:rPr lang="en-US" smtClean="0"/>
-              <a:t>12/1/2019</a:t>
+              <a:t>12/4/2019</a:t>
             </a:fld>
             <a:endParaRPr lang="en-US"/>
           </a:p>
@@ -5386,7 +6378,7 @@
           <a:p>
             <a:fld id="{163D8D13-7DED-4514-BE8C-9C8D0FD9F0B8}" type="datetimeFigureOut">
               <a:rPr lang="en-US" smtClean="0"/>
-              <a:t>12/1/2019</a:t>
+              <a:t>12/4/2019</a:t>
             </a:fld>
             <a:endParaRPr lang="en-US"/>
           </a:p>
@@ -5527,7 +6519,7 @@
           <a:p>
             <a:fld id="{163D8D13-7DED-4514-BE8C-9C8D0FD9F0B8}" type="datetimeFigureOut">
               <a:rPr lang="en-US" smtClean="0"/>
-              <a:t>12/1/2019</a:t>
+              <a:t>12/4/2019</a:t>
             </a:fld>
             <a:endParaRPr lang="en-US"/>
           </a:p>
@@ -5640,7 +6632,7 @@
           <a:p>
             <a:fld id="{163D8D13-7DED-4514-BE8C-9C8D0FD9F0B8}" type="datetimeFigureOut">
               <a:rPr lang="en-US" smtClean="0"/>
-              <a:t>12/1/2019</a:t>
+              <a:t>12/4/2019</a:t>
             </a:fld>
             <a:endParaRPr lang="en-US"/>
           </a:p>
@@ -5951,7 +6943,7 @@
           <a:p>
             <a:fld id="{163D8D13-7DED-4514-BE8C-9C8D0FD9F0B8}" type="datetimeFigureOut">
               <a:rPr lang="en-US" smtClean="0"/>
-              <a:t>12/1/2019</a:t>
+              <a:t>12/4/2019</a:t>
             </a:fld>
             <a:endParaRPr lang="en-US"/>
           </a:p>
@@ -6239,7 +7231,7 @@
           <a:p>
             <a:fld id="{163D8D13-7DED-4514-BE8C-9C8D0FD9F0B8}" type="datetimeFigureOut">
               <a:rPr lang="en-US" smtClean="0"/>
-              <a:t>12/1/2019</a:t>
+              <a:t>12/4/2019</a:t>
             </a:fld>
             <a:endParaRPr lang="en-US"/>
           </a:p>
@@ -6480,7 +7472,7 @@
           <a:p>
             <a:fld id="{163D8D13-7DED-4514-BE8C-9C8D0FD9F0B8}" type="datetimeFigureOut">
               <a:rPr lang="en-US" smtClean="0"/>
-              <a:t>12/1/2019</a:t>
+              <a:t>12/4/2019</a:t>
             </a:fld>
             <a:endParaRPr lang="en-US"/>
           </a:p>
@@ -8193,6 +9185,1064 @@
 <file path=ppt/slides/slide14.xml><?xml version="1.0" encoding="utf-8"?>
 <p:sld xmlns:a="http://schemas.openxmlformats.org/drawingml/2006/main" xmlns:r="http://schemas.openxmlformats.org/officeDocument/2006/relationships" xmlns:p="http://schemas.openxmlformats.org/presentationml/2006/main">
   <p:cSld>
+    <p:bg>
+      <p:bgPr>
+        <a:solidFill>
+          <a:schemeClr val="bg1"/>
+        </a:solidFill>
+        <a:effectLst/>
+      </p:bgPr>
+    </p:bg>
+    <p:spTree>
+      <p:nvGrpSpPr>
+        <p:cNvPr id="1" name=""/>
+        <p:cNvGrpSpPr/>
+        <p:nvPr/>
+      </p:nvGrpSpPr>
+      <p:grpSpPr>
+        <a:xfrm>
+          <a:off x="0" y="0"/>
+          <a:ext cx="0" cy="0"/>
+          <a:chOff x="0" y="0"/>
+          <a:chExt cx="0" cy="0"/>
+        </a:xfrm>
+      </p:grpSpPr>
+      <p:sp>
+        <p:nvSpPr>
+          <p:cNvPr id="22" name="Rectangle 9">
+            <a:extLst>
+              <a:ext uri="{FF2B5EF4-FFF2-40B4-BE49-F238E27FC236}">
+                <a16:creationId xmlns:a16="http://schemas.microsoft.com/office/drawing/2014/main" id="{AFA67CD3-AB4E-4A7A-BEB8-53C445D8C44E}"/>
+              </a:ext>
+              <a:ext uri="{C183D7F6-B498-43B3-948B-1728B52AA6E4}">
+                <adec:decorative xmlns:adec="http://schemas.microsoft.com/office/drawing/2017/decorative" val="1"/>
+              </a:ext>
+            </a:extLst>
+          </p:cNvPr>
+          <p:cNvSpPr>
+            <a:spLocks noGrp="1" noRot="1" noChangeAspect="1" noMove="1" noResize="1" noEditPoints="1" noAdjustHandles="1" noChangeArrowheads="1" noChangeShapeType="1" noTextEdit="1"/>
+          </p:cNvSpPr>
+          <p:nvPr>
+            <p:extLst>
+              <p:ext uri="{386F3935-93C4-4BCD-93E2-E3B085C9AB24}">
+                <p16:designElem xmlns:p16="http://schemas.microsoft.com/office/powerpoint/2015/main" val="1"/>
+              </p:ext>
+            </p:extLst>
+          </p:nvPr>
+        </p:nvSpPr>
+        <p:spPr>
+          <a:xfrm>
+            <a:off x="1" y="3726"/>
+            <a:ext cx="5614875" cy="6858000"/>
+          </a:xfrm>
+          <a:prstGeom prst="rect">
+            <a:avLst/>
+          </a:prstGeom>
+          <a:gradFill>
+            <a:gsLst>
+              <a:gs pos="0">
+                <a:schemeClr val="accent1">
+                  <a:lumMod val="100000"/>
+                  <a:alpha val="82000"/>
+                </a:schemeClr>
+              </a:gs>
+              <a:gs pos="25000">
+                <a:schemeClr val="accent1">
+                  <a:alpha val="60000"/>
+                </a:schemeClr>
+              </a:gs>
+              <a:gs pos="94000">
+                <a:schemeClr val="bg2">
+                  <a:lumMod val="75000"/>
+                </a:schemeClr>
+              </a:gs>
+              <a:gs pos="100000">
+                <a:schemeClr val="bg2">
+                  <a:lumMod val="75000"/>
+                </a:schemeClr>
+              </a:gs>
+            </a:gsLst>
+            <a:lin ang="4200000" scaled="0"/>
+          </a:gradFill>
+          <a:ln>
+            <a:noFill/>
+          </a:ln>
+        </p:spPr>
+        <p:style>
+          <a:lnRef idx="2">
+            <a:schemeClr val="accent1">
+              <a:shade val="50000"/>
+            </a:schemeClr>
+          </a:lnRef>
+          <a:fillRef idx="1">
+            <a:schemeClr val="accent1"/>
+          </a:fillRef>
+          <a:effectRef idx="0">
+            <a:schemeClr val="accent1"/>
+          </a:effectRef>
+          <a:fontRef idx="minor">
+            <a:schemeClr val="lt1"/>
+          </a:fontRef>
+        </p:style>
+        <p:txBody>
+          <a:bodyPr rtlCol="0" anchor="ctr"/>
+          <a:lstStyle/>
+          <a:p>
+            <a:pPr algn="ctr"/>
+            <a:endParaRPr lang="en-US"/>
+          </a:p>
+        </p:txBody>
+      </p:sp>
+      <p:pic>
+        <p:nvPicPr>
+          <p:cNvPr id="12" name="Picture 11">
+            <a:extLst>
+              <a:ext uri="{FF2B5EF4-FFF2-40B4-BE49-F238E27FC236}">
+                <a16:creationId xmlns:a16="http://schemas.microsoft.com/office/drawing/2014/main" id="{07CF545F-9C2E-4446-97CD-AD92990C2B68}"/>
+              </a:ext>
+              <a:ext uri="{C183D7F6-B498-43B3-948B-1728B52AA6E4}">
+                <adec:decorative xmlns:adec="http://schemas.microsoft.com/office/drawing/2017/decorative" val="1"/>
+              </a:ext>
+            </a:extLst>
+          </p:cNvPr>
+          <p:cNvPicPr>
+            <a:picLocks noGrp="1" noRot="1" noChangeAspect="1" noMove="1" noResize="1" noEditPoints="1" noAdjustHandles="1" noChangeArrowheads="1" noChangeShapeType="1" noCrop="1"/>
+          </p:cNvPicPr>
+          <p:nvPr>
+            <p:extLst>
+              <p:ext uri="{386F3935-93C4-4BCD-93E2-E3B085C9AB24}">
+                <p16:designElem xmlns:p16="http://schemas.microsoft.com/office/powerpoint/2015/main" val="1"/>
+              </p:ext>
+            </p:extLst>
+          </p:nvPr>
+        </p:nvPicPr>
+        <p:blipFill>
+          <a:blip r:embed="rId2">
+            <a:extLst>
+              <a:ext uri="{28A0092B-C50C-407E-A947-70E740481C1C}">
+                <a14:useLocalDpi xmlns:a14="http://schemas.microsoft.com/office/drawing/2010/main" val="0"/>
+              </a:ext>
+            </a:extLst>
+          </a:blip>
+          <a:stretch>
+            <a:fillRect/>
+          </a:stretch>
+        </p:blipFill>
+        <p:spPr>
+          <a:xfrm>
+            <a:off x="0" y="0"/>
+            <a:ext cx="12192000" cy="6858000"/>
+          </a:xfrm>
+          <a:prstGeom prst="rect">
+            <a:avLst/>
+          </a:prstGeom>
+        </p:spPr>
+      </p:pic>
+      <p:sp>
+        <p:nvSpPr>
+          <p:cNvPr id="2" name="Title 1">
+            <a:extLst>
+              <a:ext uri="{FF2B5EF4-FFF2-40B4-BE49-F238E27FC236}">
+                <a16:creationId xmlns:a16="http://schemas.microsoft.com/office/drawing/2014/main" id="{4BABEED0-02C4-4C5C-A655-B50A0FAB92EA}"/>
+              </a:ext>
+            </a:extLst>
+          </p:cNvPr>
+          <p:cNvSpPr>
+            <a:spLocks noGrp="1"/>
+          </p:cNvSpPr>
+          <p:nvPr>
+            <p:ph type="title"/>
+          </p:nvPr>
+        </p:nvSpPr>
+        <p:spPr>
+          <a:xfrm>
+            <a:off x="6094105" y="802955"/>
+            <a:ext cx="4977976" cy="1454051"/>
+          </a:xfrm>
+        </p:spPr>
+        <p:txBody>
+          <a:bodyPr>
+            <a:normAutofit/>
+          </a:bodyPr>
+          <a:lstStyle/>
+          <a:p>
+            <a:r>
+              <a:rPr lang="en-US">
+                <a:solidFill>
+                  <a:srgbClr val="000000"/>
+                </a:solidFill>
+              </a:rPr>
+              <a:t>Lab assignment</a:t>
+            </a:r>
+          </a:p>
+        </p:txBody>
+      </p:sp>
+      <p:sp>
+        <p:nvSpPr>
+          <p:cNvPr id="14" name="Freeform 62">
+            <a:extLst>
+              <a:ext uri="{FF2B5EF4-FFF2-40B4-BE49-F238E27FC236}">
+                <a16:creationId xmlns:a16="http://schemas.microsoft.com/office/drawing/2014/main" id="{339C8D78-A644-462F-B674-F440635E5353}"/>
+              </a:ext>
+              <a:ext uri="{C183D7F6-B498-43B3-948B-1728B52AA6E4}">
+                <adec:decorative xmlns:adec="http://schemas.microsoft.com/office/drawing/2017/decorative" val="1"/>
+              </a:ext>
+            </a:extLst>
+          </p:cNvPr>
+          <p:cNvSpPr>
+            <a:spLocks noGrp="1" noRot="1" noChangeAspect="1" noMove="1" noResize="1" noEditPoints="1" noAdjustHandles="1" noChangeArrowheads="1" noChangeShapeType="1" noTextEdit="1"/>
+          </p:cNvSpPr>
+          <p:nvPr>
+            <p:extLst>
+              <p:ext uri="{386F3935-93C4-4BCD-93E2-E3B085C9AB24}">
+                <p16:designElem xmlns:p16="http://schemas.microsoft.com/office/powerpoint/2015/main" val="1"/>
+              </p:ext>
+            </p:extLst>
+          </p:nvPr>
+        </p:nvSpPr>
+        <p:spPr>
+          <a:xfrm>
+            <a:off x="0" y="738619"/>
+            <a:ext cx="5000438" cy="5400962"/>
+          </a:xfrm>
+          <a:custGeom>
+            <a:avLst/>
+            <a:gdLst>
+              <a:gd name="connsiteX0" fmla="*/ 2299956 w 5000438"/>
+              <a:gd name="connsiteY0" fmla="*/ 0 h 5400962"/>
+              <a:gd name="connsiteX1" fmla="*/ 5000438 w 5000438"/>
+              <a:gd name="connsiteY1" fmla="*/ 2700481 h 5400962"/>
+              <a:gd name="connsiteX2" fmla="*/ 2299956 w 5000438"/>
+              <a:gd name="connsiteY2" fmla="*/ 5400962 h 5400962"/>
+              <a:gd name="connsiteX3" fmla="*/ 60675 w 5000438"/>
+              <a:gd name="connsiteY3" fmla="*/ 4210346 h 5400962"/>
+              <a:gd name="connsiteX4" fmla="*/ 0 w 5000438"/>
+              <a:gd name="connsiteY4" fmla="*/ 4110472 h 5400962"/>
+              <a:gd name="connsiteX5" fmla="*/ 0 w 5000438"/>
+              <a:gd name="connsiteY5" fmla="*/ 1290491 h 5400962"/>
+              <a:gd name="connsiteX6" fmla="*/ 60675 w 5000438"/>
+              <a:gd name="connsiteY6" fmla="*/ 1190617 h 5400962"/>
+              <a:gd name="connsiteX7" fmla="*/ 2299956 w 5000438"/>
+              <a:gd name="connsiteY7" fmla="*/ 0 h 5400962"/>
+            </a:gdLst>
+            <a:ahLst/>
+            <a:cxnLst>
+              <a:cxn ang="0">
+                <a:pos x="connsiteX0" y="connsiteY0"/>
+              </a:cxn>
+              <a:cxn ang="0">
+                <a:pos x="connsiteX1" y="connsiteY1"/>
+              </a:cxn>
+              <a:cxn ang="0">
+                <a:pos x="connsiteX2" y="connsiteY2"/>
+              </a:cxn>
+              <a:cxn ang="0">
+                <a:pos x="connsiteX3" y="connsiteY3"/>
+              </a:cxn>
+              <a:cxn ang="0">
+                <a:pos x="connsiteX4" y="connsiteY4"/>
+              </a:cxn>
+              <a:cxn ang="0">
+                <a:pos x="connsiteX5" y="connsiteY5"/>
+              </a:cxn>
+              <a:cxn ang="0">
+                <a:pos x="connsiteX6" y="connsiteY6"/>
+              </a:cxn>
+              <a:cxn ang="0">
+                <a:pos x="connsiteX7" y="connsiteY7"/>
+              </a:cxn>
+            </a:cxnLst>
+            <a:rect l="l" t="t" r="r" b="b"/>
+            <a:pathLst>
+              <a:path w="5000438" h="5400962">
+                <a:moveTo>
+                  <a:pt x="2299956" y="0"/>
+                </a:moveTo>
+                <a:cubicBezTo>
+                  <a:pt x="3791390" y="0"/>
+                  <a:pt x="5000438" y="1209047"/>
+                  <a:pt x="5000438" y="2700481"/>
+                </a:cubicBezTo>
+                <a:cubicBezTo>
+                  <a:pt x="5000438" y="4191915"/>
+                  <a:pt x="3791390" y="5400962"/>
+                  <a:pt x="2299956" y="5400962"/>
+                </a:cubicBezTo>
+                <a:cubicBezTo>
+                  <a:pt x="1367810" y="5400962"/>
+                  <a:pt x="545971" y="4928678"/>
+                  <a:pt x="60675" y="4210346"/>
+                </a:cubicBezTo>
+                <a:lnTo>
+                  <a:pt x="0" y="4110472"/>
+                </a:lnTo>
+                <a:lnTo>
+                  <a:pt x="0" y="1290491"/>
+                </a:lnTo>
+                <a:lnTo>
+                  <a:pt x="60675" y="1190617"/>
+                </a:lnTo>
+                <a:cubicBezTo>
+                  <a:pt x="545971" y="472284"/>
+                  <a:pt x="1367810" y="0"/>
+                  <a:pt x="2299956" y="0"/>
+                </a:cubicBezTo>
+                <a:close/>
+              </a:path>
+            </a:pathLst>
+          </a:custGeom>
+          <a:solidFill>
+            <a:srgbClr val="FFFFFF"/>
+          </a:solidFill>
+          <a:ln>
+            <a:gradFill>
+              <a:gsLst>
+                <a:gs pos="0">
+                  <a:schemeClr val="accent1">
+                    <a:lumMod val="40000"/>
+                    <a:lumOff val="60000"/>
+                  </a:schemeClr>
+                </a:gs>
+                <a:gs pos="23000">
+                  <a:schemeClr val="accent1">
+                    <a:lumMod val="45000"/>
+                    <a:lumOff val="55000"/>
+                  </a:schemeClr>
+                </a:gs>
+                <a:gs pos="83000">
+                  <a:schemeClr val="bg2">
+                    <a:lumMod val="85000"/>
+                  </a:schemeClr>
+                </a:gs>
+                <a:gs pos="100000">
+                  <a:schemeClr val="bg2">
+                    <a:lumMod val="85000"/>
+                  </a:schemeClr>
+                </a:gs>
+              </a:gsLst>
+              <a:lin ang="5400000" scaled="1"/>
+            </a:gradFill>
+          </a:ln>
+        </p:spPr>
+        <p:style>
+          <a:lnRef idx="2">
+            <a:schemeClr val="accent1">
+              <a:shade val="50000"/>
+            </a:schemeClr>
+          </a:lnRef>
+          <a:fillRef idx="1">
+            <a:schemeClr val="accent1"/>
+          </a:fillRef>
+          <a:effectRef idx="0">
+            <a:schemeClr val="accent1"/>
+          </a:effectRef>
+          <a:fontRef idx="minor">
+            <a:schemeClr val="lt1"/>
+          </a:fontRef>
+        </p:style>
+        <p:txBody>
+          <a:bodyPr wrap="square" rtlCol="0" anchor="ctr">
+            <a:noAutofit/>
+          </a:bodyPr>
+          <a:lstStyle/>
+          <a:p>
+            <a:pPr algn="ctr"/>
+            <a:endParaRPr lang="en-US"/>
+          </a:p>
+        </p:txBody>
+      </p:sp>
+      <p:pic>
+        <p:nvPicPr>
+          <p:cNvPr id="7" name="Graphic 6" descr="Laptop Secure">
+            <a:extLst>
+              <a:ext uri="{FF2B5EF4-FFF2-40B4-BE49-F238E27FC236}">
+                <a16:creationId xmlns:a16="http://schemas.microsoft.com/office/drawing/2014/main" id="{4634D461-C732-43F9-B051-0423388C0EE8}"/>
+              </a:ext>
+            </a:extLst>
+          </p:cNvPr>
+          <p:cNvPicPr>
+            <a:picLocks noChangeAspect="1"/>
+          </p:cNvPicPr>
+          <p:nvPr/>
+        </p:nvPicPr>
+        <p:blipFill>
+          <a:blip r:embed="rId3">
+            <a:extLst>
+              <a:ext uri="{28A0092B-C50C-407E-A947-70E740481C1C}">
+                <a14:useLocalDpi xmlns:a14="http://schemas.microsoft.com/office/drawing/2010/main" val="0"/>
+              </a:ext>
+              <a:ext uri="{96DAC541-7B7A-43D3-8B79-37D633B846F1}">
+                <asvg:svgBlip xmlns:asvg="http://schemas.microsoft.com/office/drawing/2016/SVG/main" r:embed="rId4"/>
+              </a:ext>
+            </a:extLst>
+          </a:blip>
+          <a:stretch>
+            <a:fillRect/>
+          </a:stretch>
+        </p:blipFill>
+        <p:spPr>
+          <a:xfrm>
+            <a:off x="450254" y="1629089"/>
+            <a:ext cx="3620021" cy="3620021"/>
+          </a:xfrm>
+          <a:prstGeom prst="rect">
+            <a:avLst/>
+          </a:prstGeom>
+        </p:spPr>
+      </p:pic>
+      <p:sp>
+        <p:nvSpPr>
+          <p:cNvPr id="23" name="Content Placeholder 2">
+            <a:extLst>
+              <a:ext uri="{FF2B5EF4-FFF2-40B4-BE49-F238E27FC236}">
+                <a16:creationId xmlns:a16="http://schemas.microsoft.com/office/drawing/2014/main" id="{FACA0E67-9418-4BAC-99E1-E61DC43AF6A1}"/>
+              </a:ext>
+            </a:extLst>
+          </p:cNvPr>
+          <p:cNvSpPr>
+            <a:spLocks noGrp="1"/>
+          </p:cNvSpPr>
+          <p:nvPr>
+            <p:ph idx="1"/>
+          </p:nvPr>
+        </p:nvSpPr>
+        <p:spPr>
+          <a:xfrm>
+            <a:off x="6090574" y="2421682"/>
+            <a:ext cx="4977578" cy="3639289"/>
+          </a:xfrm>
+        </p:spPr>
+        <p:txBody>
+          <a:bodyPr anchor="ctr">
+            <a:normAutofit/>
+          </a:bodyPr>
+          <a:lstStyle/>
+          <a:p>
+            <a:r>
+              <a:rPr lang="en-US" sz="2000">
+                <a:solidFill>
+                  <a:srgbClr val="000000"/>
+                </a:solidFill>
+              </a:rPr>
+              <a:t>Create a histogram containing 2 data series:</a:t>
+            </a:r>
+          </a:p>
+          <a:p>
+            <a:pPr lvl="1"/>
+            <a:r>
+              <a:rPr lang="en-US" sz="2000">
+                <a:solidFill>
+                  <a:srgbClr val="000000"/>
+                </a:solidFill>
+              </a:rPr>
+              <a:t>1 million normally distributed random values.</a:t>
+            </a:r>
+          </a:p>
+          <a:p>
+            <a:pPr lvl="1"/>
+            <a:r>
+              <a:rPr lang="en-US" sz="2000">
+                <a:solidFill>
+                  <a:srgbClr val="000000"/>
+                </a:solidFill>
+              </a:rPr>
+              <a:t>1 million uniformly distributed random values, with range from -4 to 4.</a:t>
+            </a:r>
+          </a:p>
+          <a:p>
+            <a:r>
+              <a:rPr lang="en-US" sz="2000">
+                <a:solidFill>
+                  <a:srgbClr val="000000"/>
+                </a:solidFill>
+              </a:rPr>
+              <a:t>Add a legend to the histogram indicating which color represents normal distribution and which for uniform distribution.</a:t>
+            </a:r>
+          </a:p>
+        </p:txBody>
+      </p:sp>
+    </p:spTree>
+    <p:extLst>
+      <p:ext uri="{BB962C8B-B14F-4D97-AF65-F5344CB8AC3E}">
+        <p14:creationId xmlns:p14="http://schemas.microsoft.com/office/powerpoint/2010/main" val="1553415064"/>
+      </p:ext>
+    </p:extLst>
+  </p:cSld>
+  <p:clrMapOvr>
+    <a:masterClrMapping/>
+  </p:clrMapOvr>
+</p:sld>
+</file>
+
+<file path=ppt/slides/slide15.xml><?xml version="1.0" encoding="utf-8"?>
+<p:sld xmlns:a="http://schemas.openxmlformats.org/drawingml/2006/main" xmlns:r="http://schemas.openxmlformats.org/officeDocument/2006/relationships" xmlns:p="http://schemas.openxmlformats.org/presentationml/2006/main">
+  <p:cSld>
+    <p:spTree>
+      <p:nvGrpSpPr>
+        <p:cNvPr id="1" name=""/>
+        <p:cNvGrpSpPr/>
+        <p:nvPr/>
+      </p:nvGrpSpPr>
+      <p:grpSpPr>
+        <a:xfrm>
+          <a:off x="0" y="0"/>
+          <a:ext cx="0" cy="0"/>
+          <a:chOff x="0" y="0"/>
+          <a:chExt cx="0" cy="0"/>
+        </a:xfrm>
+      </p:grpSpPr>
+      <p:sp>
+        <p:nvSpPr>
+          <p:cNvPr id="2" name="Title 1">
+            <a:extLst>
+              <a:ext uri="{FF2B5EF4-FFF2-40B4-BE49-F238E27FC236}">
+                <a16:creationId xmlns:a16="http://schemas.microsoft.com/office/drawing/2014/main" id="{E4B5C8D2-2EA1-4645-BFB8-A0DA557D50D8}"/>
+              </a:ext>
+            </a:extLst>
+          </p:cNvPr>
+          <p:cNvSpPr>
+            <a:spLocks noGrp="1"/>
+          </p:cNvSpPr>
+          <p:nvPr>
+            <p:ph type="title"/>
+          </p:nvPr>
+        </p:nvSpPr>
+        <p:spPr/>
+        <p:txBody>
+          <a:bodyPr/>
+          <a:lstStyle/>
+          <a:p>
+            <a:r>
+              <a:rPr lang="en-US" dirty="0"/>
+              <a:t>Homework assignment</a:t>
+            </a:r>
+          </a:p>
+        </p:txBody>
+      </p:sp>
+      <p:sp>
+        <p:nvSpPr>
+          <p:cNvPr id="3" name="Content Placeholder 2">
+            <a:extLst>
+              <a:ext uri="{FF2B5EF4-FFF2-40B4-BE49-F238E27FC236}">
+                <a16:creationId xmlns:a16="http://schemas.microsoft.com/office/drawing/2014/main" id="{E020889E-45AD-4AC6-8D6B-F1B98A38F671}"/>
+              </a:ext>
+            </a:extLst>
+          </p:cNvPr>
+          <p:cNvSpPr>
+            <a:spLocks noGrp="1"/>
+          </p:cNvSpPr>
+          <p:nvPr>
+            <p:ph idx="1"/>
+          </p:nvPr>
+        </p:nvSpPr>
+        <p:spPr/>
+        <p:txBody>
+          <a:bodyPr>
+            <a:normAutofit fontScale="77500" lnSpcReduction="20000"/>
+          </a:bodyPr>
+          <a:lstStyle/>
+          <a:p>
+            <a:r>
+              <a:rPr lang="en-US" dirty="0"/>
+              <a:t>Given the following quarterly sales data:</a:t>
+            </a:r>
+            <a:br>
+              <a:rPr lang="en-US" dirty="0"/>
+            </a:br>
+            <a:endParaRPr lang="en-US" dirty="0"/>
+          </a:p>
+          <a:p>
+            <a:endParaRPr lang="en-US" dirty="0"/>
+          </a:p>
+          <a:p>
+            <a:endParaRPr lang="en-US" dirty="0"/>
+          </a:p>
+          <a:p>
+            <a:endParaRPr lang="en-US" dirty="0"/>
+          </a:p>
+          <a:p>
+            <a:pPr lvl="1"/>
+            <a:endParaRPr lang="en-US" dirty="0"/>
+          </a:p>
+          <a:p>
+            <a:pPr lvl="1"/>
+            <a:endParaRPr lang="en-US" dirty="0"/>
+          </a:p>
+          <a:p>
+            <a:pPr lvl="1">
+              <a:lnSpc>
+                <a:spcPct val="120000"/>
+              </a:lnSpc>
+            </a:pPr>
+            <a:r>
+              <a:rPr lang="en-US" dirty="0"/>
+              <a:t>Plot a </a:t>
+            </a:r>
+            <a:r>
+              <a:rPr lang="en-US" dirty="0" err="1"/>
+              <a:t>barchart</a:t>
+            </a:r>
+            <a:r>
+              <a:rPr lang="en-US" dirty="0"/>
+              <a:t> with quarters on the horizontal axis, and sales on the vertical axis, showing each year as a separate bar, with a legend indicating years, as shown in the above chart.</a:t>
+            </a:r>
+            <a:br>
+              <a:rPr lang="en-US" dirty="0"/>
+            </a:br>
+            <a:endParaRPr lang="en-US" dirty="0"/>
+          </a:p>
+          <a:p>
+            <a:pPr lvl="1">
+              <a:lnSpc>
+                <a:spcPct val="120000"/>
+              </a:lnSpc>
+            </a:pPr>
+            <a:r>
+              <a:rPr lang="en-US" dirty="0"/>
+              <a:t>Plot a stacked </a:t>
+            </a:r>
+            <a:r>
+              <a:rPr lang="en-US" dirty="0" err="1"/>
+              <a:t>barchart</a:t>
+            </a:r>
+            <a:r>
+              <a:rPr lang="en-US" dirty="0"/>
+              <a:t> with years on the horizontal axis, and sales on the vertical axis. Each year’s bar should be a stack of Q1, Q2, Q3 and Q4 sales, with a legend indicating quarters.</a:t>
+            </a:r>
+          </a:p>
+          <a:p>
+            <a:pPr lvl="1"/>
+            <a:endParaRPr lang="en-US" dirty="0"/>
+          </a:p>
+          <a:p>
+            <a:pPr lvl="1"/>
+            <a:r>
+              <a:rPr lang="en-US" dirty="0"/>
+              <a:t>TIP: refer to matplotlib gallery for help! https://matplotlib.org/gallery.html</a:t>
+            </a:r>
+          </a:p>
+        </p:txBody>
+      </p:sp>
+      <p:graphicFrame>
+        <p:nvGraphicFramePr>
+          <p:cNvPr id="4" name="Table 3">
+            <a:extLst>
+              <a:ext uri="{FF2B5EF4-FFF2-40B4-BE49-F238E27FC236}">
+                <a16:creationId xmlns:a16="http://schemas.microsoft.com/office/drawing/2014/main" id="{864CFAA3-BD89-4F16-AA30-95D51D52DCF2}"/>
+              </a:ext>
+            </a:extLst>
+          </p:cNvPr>
+          <p:cNvGraphicFramePr>
+            <a:graphicFrameLocks noGrp="1"/>
+          </p:cNvGraphicFramePr>
+          <p:nvPr>
+            <p:extLst>
+              <p:ext uri="{D42A27DB-BD31-4B8C-83A1-F6EECF244321}">
+                <p14:modId xmlns:p14="http://schemas.microsoft.com/office/powerpoint/2010/main" val="3531863144"/>
+              </p:ext>
+            </p:extLst>
+          </p:nvPr>
+        </p:nvGraphicFramePr>
+        <p:xfrm>
+          <a:off x="1183860" y="2309927"/>
+          <a:ext cx="5283200" cy="1483360"/>
+        </p:xfrm>
+        <a:graphic>
+          <a:graphicData uri="http://schemas.openxmlformats.org/drawingml/2006/table">
+            <a:tbl>
+              <a:tblPr firstRow="1" firstCol="1" bandRow="1">
+                <a:tableStyleId>{5C22544A-7EE6-4342-B048-85BDC9FD1C3A}</a:tableStyleId>
+              </a:tblPr>
+              <a:tblGrid>
+                <a:gridCol w="1056640">
+                  <a:extLst>
+                    <a:ext uri="{9D8B030D-6E8A-4147-A177-3AD203B41FA5}">
+                      <a16:colId xmlns:a16="http://schemas.microsoft.com/office/drawing/2014/main" val="2018172643"/>
+                    </a:ext>
+                  </a:extLst>
+                </a:gridCol>
+                <a:gridCol w="1056640">
+                  <a:extLst>
+                    <a:ext uri="{9D8B030D-6E8A-4147-A177-3AD203B41FA5}">
+                      <a16:colId xmlns:a16="http://schemas.microsoft.com/office/drawing/2014/main" val="203018565"/>
+                    </a:ext>
+                  </a:extLst>
+                </a:gridCol>
+                <a:gridCol w="1056640">
+                  <a:extLst>
+                    <a:ext uri="{9D8B030D-6E8A-4147-A177-3AD203B41FA5}">
+                      <a16:colId xmlns:a16="http://schemas.microsoft.com/office/drawing/2014/main" val="1380080162"/>
+                    </a:ext>
+                  </a:extLst>
+                </a:gridCol>
+                <a:gridCol w="1056640">
+                  <a:extLst>
+                    <a:ext uri="{9D8B030D-6E8A-4147-A177-3AD203B41FA5}">
+                      <a16:colId xmlns:a16="http://schemas.microsoft.com/office/drawing/2014/main" val="793944594"/>
+                    </a:ext>
+                  </a:extLst>
+                </a:gridCol>
+                <a:gridCol w="1056640">
+                  <a:extLst>
+                    <a:ext uri="{9D8B030D-6E8A-4147-A177-3AD203B41FA5}">
+                      <a16:colId xmlns:a16="http://schemas.microsoft.com/office/drawing/2014/main" val="4209139228"/>
+                    </a:ext>
+                  </a:extLst>
+                </a:gridCol>
+              </a:tblGrid>
+              <a:tr h="370840">
+                <a:tc>
+                  <a:txBody>
+                    <a:bodyPr/>
+                    <a:lstStyle/>
+                    <a:p>
+                      <a:pPr algn="ctr"/>
+                      <a:endParaRPr lang="en-US" dirty="0"/>
+                    </a:p>
+                  </a:txBody>
+                  <a:tcPr/>
+                </a:tc>
+                <a:tc>
+                  <a:txBody>
+                    <a:bodyPr/>
+                    <a:lstStyle/>
+                    <a:p>
+                      <a:pPr algn="ctr"/>
+                      <a:r>
+                        <a:rPr lang="en-US" dirty="0"/>
+                        <a:t>Q1</a:t>
+                      </a:r>
+                    </a:p>
+                  </a:txBody>
+                  <a:tcPr/>
+                </a:tc>
+                <a:tc>
+                  <a:txBody>
+                    <a:bodyPr/>
+                    <a:lstStyle/>
+                    <a:p>
+                      <a:pPr algn="ctr"/>
+                      <a:r>
+                        <a:rPr lang="en-US" dirty="0"/>
+                        <a:t>Q2</a:t>
+                      </a:r>
+                    </a:p>
+                  </a:txBody>
+                  <a:tcPr/>
+                </a:tc>
+                <a:tc>
+                  <a:txBody>
+                    <a:bodyPr/>
+                    <a:lstStyle/>
+                    <a:p>
+                      <a:pPr algn="ctr"/>
+                      <a:r>
+                        <a:rPr lang="en-US" dirty="0"/>
+                        <a:t>Q3</a:t>
+                      </a:r>
+                    </a:p>
+                  </a:txBody>
+                  <a:tcPr/>
+                </a:tc>
+                <a:tc>
+                  <a:txBody>
+                    <a:bodyPr/>
+                    <a:lstStyle/>
+                    <a:p>
+                      <a:pPr algn="ctr"/>
+                      <a:r>
+                        <a:rPr lang="en-US" dirty="0"/>
+                        <a:t>Q4</a:t>
+                      </a:r>
+                    </a:p>
+                  </a:txBody>
+                  <a:tcPr/>
+                </a:tc>
+                <a:extLst>
+                  <a:ext uri="{0D108BD9-81ED-4DB2-BD59-A6C34878D82A}">
+                    <a16:rowId xmlns:a16="http://schemas.microsoft.com/office/drawing/2014/main" val="588971375"/>
+                  </a:ext>
+                </a:extLst>
+              </a:tr>
+              <a:tr h="370840">
+                <a:tc>
+                  <a:txBody>
+                    <a:bodyPr/>
+                    <a:lstStyle/>
+                    <a:p>
+                      <a:pPr algn="ctr"/>
+                      <a:r>
+                        <a:rPr lang="en-US" dirty="0"/>
+                        <a:t>2017</a:t>
+                      </a:r>
+                    </a:p>
+                  </a:txBody>
+                  <a:tcPr/>
+                </a:tc>
+                <a:tc>
+                  <a:txBody>
+                    <a:bodyPr/>
+                    <a:lstStyle/>
+                    <a:p>
+                      <a:pPr algn="r"/>
+                      <a:r>
+                        <a:rPr lang="en-US" dirty="0"/>
+                        <a:t>425</a:t>
+                      </a:r>
+                    </a:p>
+                  </a:txBody>
+                  <a:tcPr/>
+                </a:tc>
+                <a:tc>
+                  <a:txBody>
+                    <a:bodyPr/>
+                    <a:lstStyle/>
+                    <a:p>
+                      <a:pPr algn="r"/>
+                      <a:r>
+                        <a:rPr lang="en-US" dirty="0"/>
+                        <a:t>366</a:t>
+                      </a:r>
+                    </a:p>
+                  </a:txBody>
+                  <a:tcPr/>
+                </a:tc>
+                <a:tc>
+                  <a:txBody>
+                    <a:bodyPr/>
+                    <a:lstStyle/>
+                    <a:p>
+                      <a:pPr algn="r"/>
+                      <a:r>
+                        <a:rPr lang="en-US" dirty="0"/>
+                        <a:t>498</a:t>
+                      </a:r>
+                    </a:p>
+                  </a:txBody>
+                  <a:tcPr/>
+                </a:tc>
+                <a:tc>
+                  <a:txBody>
+                    <a:bodyPr/>
+                    <a:lstStyle/>
+                    <a:p>
+                      <a:pPr algn="r"/>
+                      <a:r>
+                        <a:rPr lang="en-US" dirty="0"/>
+                        <a:t>403</a:t>
+                      </a:r>
+                    </a:p>
+                  </a:txBody>
+                  <a:tcPr/>
+                </a:tc>
+                <a:extLst>
+                  <a:ext uri="{0D108BD9-81ED-4DB2-BD59-A6C34878D82A}">
+                    <a16:rowId xmlns:a16="http://schemas.microsoft.com/office/drawing/2014/main" val="3057096566"/>
+                  </a:ext>
+                </a:extLst>
+              </a:tr>
+              <a:tr h="370840">
+                <a:tc>
+                  <a:txBody>
+                    <a:bodyPr/>
+                    <a:lstStyle/>
+                    <a:p>
+                      <a:pPr algn="ctr"/>
+                      <a:r>
+                        <a:rPr lang="en-US" dirty="0"/>
+                        <a:t>2018</a:t>
+                      </a:r>
+                    </a:p>
+                  </a:txBody>
+                  <a:tcPr/>
+                </a:tc>
+                <a:tc>
+                  <a:txBody>
+                    <a:bodyPr/>
+                    <a:lstStyle/>
+                    <a:p>
+                      <a:pPr algn="r"/>
+                      <a:r>
+                        <a:rPr lang="en-US" dirty="0"/>
+                        <a:t>486</a:t>
+                      </a:r>
+                    </a:p>
+                  </a:txBody>
+                  <a:tcPr/>
+                </a:tc>
+                <a:tc>
+                  <a:txBody>
+                    <a:bodyPr/>
+                    <a:lstStyle/>
+                    <a:p>
+                      <a:pPr algn="r"/>
+                      <a:r>
+                        <a:rPr lang="en-US" dirty="0"/>
+                        <a:t>385</a:t>
+                      </a:r>
+                    </a:p>
+                  </a:txBody>
+                  <a:tcPr/>
+                </a:tc>
+                <a:tc>
+                  <a:txBody>
+                    <a:bodyPr/>
+                    <a:lstStyle/>
+                    <a:p>
+                      <a:pPr algn="r"/>
+                      <a:r>
+                        <a:rPr lang="en-US" dirty="0"/>
+                        <a:t>546</a:t>
+                      </a:r>
+                    </a:p>
+                  </a:txBody>
+                  <a:tcPr/>
+                </a:tc>
+                <a:tc>
+                  <a:txBody>
+                    <a:bodyPr/>
+                    <a:lstStyle/>
+                    <a:p>
+                      <a:pPr algn="r"/>
+                      <a:r>
+                        <a:rPr lang="en-US" dirty="0"/>
+                        <a:t>432</a:t>
+                      </a:r>
+                    </a:p>
+                  </a:txBody>
+                  <a:tcPr/>
+                </a:tc>
+                <a:extLst>
+                  <a:ext uri="{0D108BD9-81ED-4DB2-BD59-A6C34878D82A}">
+                    <a16:rowId xmlns:a16="http://schemas.microsoft.com/office/drawing/2014/main" val="1105493722"/>
+                  </a:ext>
+                </a:extLst>
+              </a:tr>
+              <a:tr h="370840">
+                <a:tc>
+                  <a:txBody>
+                    <a:bodyPr/>
+                    <a:lstStyle/>
+                    <a:p>
+                      <a:pPr algn="ctr"/>
+                      <a:r>
+                        <a:rPr lang="en-US" dirty="0"/>
+                        <a:t>2019</a:t>
+                      </a:r>
+                    </a:p>
+                  </a:txBody>
+                  <a:tcPr/>
+                </a:tc>
+                <a:tc>
+                  <a:txBody>
+                    <a:bodyPr/>
+                    <a:lstStyle/>
+                    <a:p>
+                      <a:pPr algn="r"/>
+                      <a:r>
+                        <a:rPr lang="en-US" dirty="0"/>
+                        <a:t>474</a:t>
+                      </a:r>
+                    </a:p>
+                  </a:txBody>
+                  <a:tcPr/>
+                </a:tc>
+                <a:tc>
+                  <a:txBody>
+                    <a:bodyPr/>
+                    <a:lstStyle/>
+                    <a:p>
+                      <a:pPr algn="r"/>
+                      <a:r>
+                        <a:rPr lang="en-US" dirty="0"/>
+                        <a:t>390</a:t>
+                      </a:r>
+                    </a:p>
+                  </a:txBody>
+                  <a:tcPr/>
+                </a:tc>
+                <a:tc>
+                  <a:txBody>
+                    <a:bodyPr/>
+                    <a:lstStyle/>
+                    <a:p>
+                      <a:pPr algn="r"/>
+                      <a:r>
+                        <a:rPr lang="en-US" dirty="0"/>
+                        <a:t>538</a:t>
+                      </a:r>
+                    </a:p>
+                  </a:txBody>
+                  <a:tcPr/>
+                </a:tc>
+                <a:tc>
+                  <a:txBody>
+                    <a:bodyPr/>
+                    <a:lstStyle/>
+                    <a:p>
+                      <a:pPr algn="r"/>
+                      <a:r>
+                        <a:rPr lang="en-US" dirty="0"/>
+                        <a:t>412</a:t>
+                      </a:r>
+                    </a:p>
+                  </a:txBody>
+                  <a:tcPr/>
+                </a:tc>
+                <a:extLst>
+                  <a:ext uri="{0D108BD9-81ED-4DB2-BD59-A6C34878D82A}">
+                    <a16:rowId xmlns:a16="http://schemas.microsoft.com/office/drawing/2014/main" val="208368489"/>
+                  </a:ext>
+                </a:extLst>
+              </a:tr>
+            </a:tbl>
+          </a:graphicData>
+        </a:graphic>
+      </p:graphicFrame>
+      <p:graphicFrame>
+        <p:nvGraphicFramePr>
+          <p:cNvPr id="10" name="Chart 9">
+            <a:extLst>
+              <a:ext uri="{FF2B5EF4-FFF2-40B4-BE49-F238E27FC236}">
+                <a16:creationId xmlns:a16="http://schemas.microsoft.com/office/drawing/2014/main" id="{E770B913-A4A4-429C-8414-7172967B8A5E}"/>
+              </a:ext>
+            </a:extLst>
+          </p:cNvPr>
+          <p:cNvGraphicFramePr/>
+          <p:nvPr>
+            <p:extLst>
+              <p:ext uri="{D42A27DB-BD31-4B8C-83A1-F6EECF244321}">
+                <p14:modId xmlns:p14="http://schemas.microsoft.com/office/powerpoint/2010/main" val="2928838575"/>
+              </p:ext>
+            </p:extLst>
+          </p:nvPr>
+        </p:nvGraphicFramePr>
+        <p:xfrm>
+          <a:off x="7125253" y="1690688"/>
+          <a:ext cx="3882887" cy="2383676"/>
+        </p:xfrm>
+        <a:graphic>
+          <a:graphicData uri="http://schemas.openxmlformats.org/drawingml/2006/chart">
+            <c:chart xmlns:c="http://schemas.openxmlformats.org/drawingml/2006/chart" xmlns:r="http://schemas.openxmlformats.org/officeDocument/2006/relationships" r:id="rId2"/>
+          </a:graphicData>
+        </a:graphic>
+      </p:graphicFrame>
+    </p:spTree>
+    <p:extLst>
+      <p:ext uri="{BB962C8B-B14F-4D97-AF65-F5344CB8AC3E}">
+        <p14:creationId xmlns:p14="http://schemas.microsoft.com/office/powerpoint/2010/main" val="1981020890"/>
+      </p:ext>
+    </p:extLst>
+  </p:cSld>
+  <p:clrMapOvr>
+    <a:masterClrMapping/>
+  </p:clrMapOvr>
+</p:sld>
+</file>
+
+<file path=ppt/slides/slide16.xml><?xml version="1.0" encoding="utf-8"?>
+<p:sld xmlns:a="http://schemas.openxmlformats.org/drawingml/2006/main" xmlns:r="http://schemas.openxmlformats.org/officeDocument/2006/relationships" xmlns:p="http://schemas.openxmlformats.org/presentationml/2006/main">
+  <p:cSld>
     <p:spTree>
       <p:nvGrpSpPr>
         <p:cNvPr id="1" name=""/>
@@ -8283,7 +10333,7 @@
 </p:sld>
 </file>
 
-<file path=ppt/slides/slide15.xml><?xml version="1.0" encoding="utf-8"?>
+<file path=ppt/slides/slide17.xml><?xml version="1.0" encoding="utf-8"?>
 <p:sld xmlns:a="http://schemas.openxmlformats.org/drawingml/2006/main" xmlns:r="http://schemas.openxmlformats.org/officeDocument/2006/relationships" xmlns:p="http://schemas.openxmlformats.org/presentationml/2006/main">
   <p:cSld>
     <p:bg>
@@ -8778,7 +10828,7 @@
 </p:sld>
 </file>
 
-<file path=ppt/slides/slide16.xml><?xml version="1.0" encoding="utf-8"?>
+<file path=ppt/slides/slide18.xml><?xml version="1.0" encoding="utf-8"?>
 <p:sld xmlns:a="http://schemas.openxmlformats.org/drawingml/2006/main" xmlns:r="http://schemas.openxmlformats.org/officeDocument/2006/relationships" xmlns:p="http://schemas.openxmlformats.org/presentationml/2006/main">
   <p:cSld>
     <p:bg>
@@ -9087,7 +11137,7 @@
 </p:sld>
 </file>
 
-<file path=ppt/slides/slide17.xml><?xml version="1.0" encoding="utf-8"?>
+<file path=ppt/slides/slide19.xml><?xml version="1.0" encoding="utf-8"?>
 <p:sld xmlns:a="http://schemas.openxmlformats.org/drawingml/2006/main" xmlns:r="http://schemas.openxmlformats.org/officeDocument/2006/relationships" xmlns:p="http://schemas.openxmlformats.org/presentationml/2006/main">
   <p:cSld>
     <p:spTree>
@@ -9180,7 +11230,629 @@
 </p:sld>
 </file>
 
-<file path=ppt/slides/slide18.xml><?xml version="1.0" encoding="utf-8"?>
+<file path=ppt/slides/slide2.xml><?xml version="1.0" encoding="utf-8"?>
+<p:sld xmlns:a="http://schemas.openxmlformats.org/drawingml/2006/main" xmlns:r="http://schemas.openxmlformats.org/officeDocument/2006/relationships" xmlns:p="http://schemas.openxmlformats.org/presentationml/2006/main">
+  <p:cSld>
+    <p:bg>
+      <p:bgPr>
+        <a:solidFill>
+          <a:schemeClr val="bg1"/>
+        </a:solidFill>
+        <a:effectLst/>
+      </p:bgPr>
+    </p:bg>
+    <p:spTree>
+      <p:nvGrpSpPr>
+        <p:cNvPr id="1" name=""/>
+        <p:cNvGrpSpPr/>
+        <p:nvPr/>
+      </p:nvGrpSpPr>
+      <p:grpSpPr>
+        <a:xfrm>
+          <a:off x="0" y="0"/>
+          <a:ext cx="0" cy="0"/>
+          <a:chOff x="0" y="0"/>
+          <a:chExt cx="0" cy="0"/>
+        </a:xfrm>
+      </p:grpSpPr>
+      <p:sp>
+        <p:nvSpPr>
+          <p:cNvPr id="10" name="Rectangle 9">
+            <a:extLst>
+              <a:ext uri="{FF2B5EF4-FFF2-40B4-BE49-F238E27FC236}">
+                <a16:creationId xmlns:a16="http://schemas.microsoft.com/office/drawing/2014/main" id="{AFA67CD3-AB4E-4A7A-BEB8-53C445D8C44E}"/>
+              </a:ext>
+              <a:ext uri="{C183D7F6-B498-43B3-948B-1728B52AA6E4}">
+                <adec:decorative xmlns:adec="http://schemas.microsoft.com/office/drawing/2017/decorative" val="1"/>
+              </a:ext>
+            </a:extLst>
+          </p:cNvPr>
+          <p:cNvSpPr>
+            <a:spLocks noGrp="1" noRot="1" noChangeAspect="1" noMove="1" noResize="1" noEditPoints="1" noAdjustHandles="1" noChangeArrowheads="1" noChangeShapeType="1" noTextEdit="1"/>
+          </p:cNvSpPr>
+          <p:nvPr>
+            <p:extLst>
+              <p:ext uri="{386F3935-93C4-4BCD-93E2-E3B085C9AB24}">
+                <p16:designElem xmlns:p16="http://schemas.microsoft.com/office/powerpoint/2015/main" val="1"/>
+              </p:ext>
+            </p:extLst>
+          </p:nvPr>
+        </p:nvSpPr>
+        <p:spPr>
+          <a:xfrm>
+            <a:off x="1" y="3726"/>
+            <a:ext cx="5614875" cy="6858000"/>
+          </a:xfrm>
+          <a:prstGeom prst="rect">
+            <a:avLst/>
+          </a:prstGeom>
+          <a:gradFill>
+            <a:gsLst>
+              <a:gs pos="0">
+                <a:schemeClr val="accent6"/>
+              </a:gs>
+              <a:gs pos="25000">
+                <a:schemeClr val="accent6"/>
+              </a:gs>
+              <a:gs pos="94000">
+                <a:schemeClr val="accent1"/>
+              </a:gs>
+              <a:gs pos="100000">
+                <a:schemeClr val="accent1"/>
+              </a:gs>
+            </a:gsLst>
+            <a:lin ang="4200000" scaled="0"/>
+          </a:gradFill>
+          <a:ln>
+            <a:noFill/>
+          </a:ln>
+        </p:spPr>
+        <p:style>
+          <a:lnRef idx="2">
+            <a:schemeClr val="accent1">
+              <a:shade val="50000"/>
+            </a:schemeClr>
+          </a:lnRef>
+          <a:fillRef idx="1">
+            <a:schemeClr val="accent1"/>
+          </a:fillRef>
+          <a:effectRef idx="0">
+            <a:schemeClr val="accent1"/>
+          </a:effectRef>
+          <a:fontRef idx="minor">
+            <a:schemeClr val="lt1"/>
+          </a:fontRef>
+        </p:style>
+        <p:txBody>
+          <a:bodyPr rtlCol="0" anchor="ctr"/>
+          <a:lstStyle/>
+          <a:p>
+            <a:pPr algn="ctr"/>
+            <a:endParaRPr lang="en-US"/>
+          </a:p>
+        </p:txBody>
+      </p:sp>
+      <p:pic>
+        <p:nvPicPr>
+          <p:cNvPr id="12" name="Picture 11">
+            <a:extLst>
+              <a:ext uri="{FF2B5EF4-FFF2-40B4-BE49-F238E27FC236}">
+                <a16:creationId xmlns:a16="http://schemas.microsoft.com/office/drawing/2014/main" id="{07CF545F-9C2E-4446-97CD-AD92990C2B68}"/>
+              </a:ext>
+              <a:ext uri="{C183D7F6-B498-43B3-948B-1728B52AA6E4}">
+                <adec:decorative xmlns:adec="http://schemas.microsoft.com/office/drawing/2017/decorative" val="1"/>
+              </a:ext>
+            </a:extLst>
+          </p:cNvPr>
+          <p:cNvPicPr>
+            <a:picLocks noGrp="1" noRot="1" noChangeAspect="1" noMove="1" noResize="1" noEditPoints="1" noAdjustHandles="1" noChangeArrowheads="1" noChangeShapeType="1" noCrop="1"/>
+          </p:cNvPicPr>
+          <p:nvPr>
+            <p:extLst>
+              <p:ext uri="{386F3935-93C4-4BCD-93E2-E3B085C9AB24}">
+                <p16:designElem xmlns:p16="http://schemas.microsoft.com/office/powerpoint/2015/main" val="1"/>
+              </p:ext>
+            </p:extLst>
+          </p:nvPr>
+        </p:nvPicPr>
+        <p:blipFill>
+          <a:blip r:embed="rId2">
+            <a:extLst>
+              <a:ext uri="{28A0092B-C50C-407E-A947-70E740481C1C}">
+                <a14:useLocalDpi xmlns:a14="http://schemas.microsoft.com/office/drawing/2010/main" val="0"/>
+              </a:ext>
+            </a:extLst>
+          </a:blip>
+          <a:stretch>
+            <a:fillRect/>
+          </a:stretch>
+        </p:blipFill>
+        <p:spPr>
+          <a:xfrm>
+            <a:off x="0" y="0"/>
+            <a:ext cx="12192000" cy="6858000"/>
+          </a:xfrm>
+          <a:prstGeom prst="rect">
+            <a:avLst/>
+          </a:prstGeom>
+        </p:spPr>
+      </p:pic>
+      <p:sp>
+        <p:nvSpPr>
+          <p:cNvPr id="2" name="Title 1">
+            <a:extLst>
+              <a:ext uri="{FF2B5EF4-FFF2-40B4-BE49-F238E27FC236}">
+                <a16:creationId xmlns:a16="http://schemas.microsoft.com/office/drawing/2014/main" id="{681BFD9F-8D2D-422B-B38B-9D170D11248E}"/>
+              </a:ext>
+            </a:extLst>
+          </p:cNvPr>
+          <p:cNvSpPr>
+            <a:spLocks noGrp="1"/>
+          </p:cNvSpPr>
+          <p:nvPr>
+            <p:ph type="title"/>
+          </p:nvPr>
+        </p:nvSpPr>
+        <p:spPr>
+          <a:xfrm>
+            <a:off x="6094105" y="802955"/>
+            <a:ext cx="4977976" cy="1454051"/>
+          </a:xfrm>
+        </p:spPr>
+        <p:txBody>
+          <a:bodyPr>
+            <a:normAutofit/>
+          </a:bodyPr>
+          <a:lstStyle/>
+          <a:p>
+            <a:r>
+              <a:rPr lang="en-US">
+                <a:solidFill>
+                  <a:srgbClr val="000000"/>
+                </a:solidFill>
+              </a:rPr>
+              <a:t>About Gene IT Solutions</a:t>
+            </a:r>
+          </a:p>
+        </p:txBody>
+      </p:sp>
+      <p:sp>
+        <p:nvSpPr>
+          <p:cNvPr id="14" name="Freeform 62">
+            <a:extLst>
+              <a:ext uri="{FF2B5EF4-FFF2-40B4-BE49-F238E27FC236}">
+                <a16:creationId xmlns:a16="http://schemas.microsoft.com/office/drawing/2014/main" id="{339C8D78-A644-462F-B674-F440635E5353}"/>
+              </a:ext>
+              <a:ext uri="{C183D7F6-B498-43B3-948B-1728B52AA6E4}">
+                <adec:decorative xmlns:adec="http://schemas.microsoft.com/office/drawing/2017/decorative" val="1"/>
+              </a:ext>
+            </a:extLst>
+          </p:cNvPr>
+          <p:cNvSpPr>
+            <a:spLocks noGrp="1" noRot="1" noChangeAspect="1" noMove="1" noResize="1" noEditPoints="1" noAdjustHandles="1" noChangeArrowheads="1" noChangeShapeType="1" noTextEdit="1"/>
+          </p:cNvSpPr>
+          <p:nvPr>
+            <p:extLst>
+              <p:ext uri="{386F3935-93C4-4BCD-93E2-E3B085C9AB24}">
+                <p16:designElem xmlns:p16="http://schemas.microsoft.com/office/powerpoint/2015/main" val="1"/>
+              </p:ext>
+            </p:extLst>
+          </p:nvPr>
+        </p:nvSpPr>
+        <p:spPr>
+          <a:xfrm>
+            <a:off x="0" y="738619"/>
+            <a:ext cx="5000438" cy="5400962"/>
+          </a:xfrm>
+          <a:custGeom>
+            <a:avLst/>
+            <a:gdLst>
+              <a:gd name="connsiteX0" fmla="*/ 2299956 w 5000438"/>
+              <a:gd name="connsiteY0" fmla="*/ 0 h 5400962"/>
+              <a:gd name="connsiteX1" fmla="*/ 5000438 w 5000438"/>
+              <a:gd name="connsiteY1" fmla="*/ 2700481 h 5400962"/>
+              <a:gd name="connsiteX2" fmla="*/ 2299956 w 5000438"/>
+              <a:gd name="connsiteY2" fmla="*/ 5400962 h 5400962"/>
+              <a:gd name="connsiteX3" fmla="*/ 60675 w 5000438"/>
+              <a:gd name="connsiteY3" fmla="*/ 4210346 h 5400962"/>
+              <a:gd name="connsiteX4" fmla="*/ 0 w 5000438"/>
+              <a:gd name="connsiteY4" fmla="*/ 4110472 h 5400962"/>
+              <a:gd name="connsiteX5" fmla="*/ 0 w 5000438"/>
+              <a:gd name="connsiteY5" fmla="*/ 1290491 h 5400962"/>
+              <a:gd name="connsiteX6" fmla="*/ 60675 w 5000438"/>
+              <a:gd name="connsiteY6" fmla="*/ 1190617 h 5400962"/>
+              <a:gd name="connsiteX7" fmla="*/ 2299956 w 5000438"/>
+              <a:gd name="connsiteY7" fmla="*/ 0 h 5400962"/>
+            </a:gdLst>
+            <a:ahLst/>
+            <a:cxnLst>
+              <a:cxn ang="0">
+                <a:pos x="connsiteX0" y="connsiteY0"/>
+              </a:cxn>
+              <a:cxn ang="0">
+                <a:pos x="connsiteX1" y="connsiteY1"/>
+              </a:cxn>
+              <a:cxn ang="0">
+                <a:pos x="connsiteX2" y="connsiteY2"/>
+              </a:cxn>
+              <a:cxn ang="0">
+                <a:pos x="connsiteX3" y="connsiteY3"/>
+              </a:cxn>
+              <a:cxn ang="0">
+                <a:pos x="connsiteX4" y="connsiteY4"/>
+              </a:cxn>
+              <a:cxn ang="0">
+                <a:pos x="connsiteX5" y="connsiteY5"/>
+              </a:cxn>
+              <a:cxn ang="0">
+                <a:pos x="connsiteX6" y="connsiteY6"/>
+              </a:cxn>
+              <a:cxn ang="0">
+                <a:pos x="connsiteX7" y="connsiteY7"/>
+              </a:cxn>
+            </a:cxnLst>
+            <a:rect l="l" t="t" r="r" b="b"/>
+            <a:pathLst>
+              <a:path w="5000438" h="5400962">
+                <a:moveTo>
+                  <a:pt x="2299956" y="0"/>
+                </a:moveTo>
+                <a:cubicBezTo>
+                  <a:pt x="3791390" y="0"/>
+                  <a:pt x="5000438" y="1209047"/>
+                  <a:pt x="5000438" y="2700481"/>
+                </a:cubicBezTo>
+                <a:cubicBezTo>
+                  <a:pt x="5000438" y="4191915"/>
+                  <a:pt x="3791390" y="5400962"/>
+                  <a:pt x="2299956" y="5400962"/>
+                </a:cubicBezTo>
+                <a:cubicBezTo>
+                  <a:pt x="1367810" y="5400962"/>
+                  <a:pt x="545971" y="4928678"/>
+                  <a:pt x="60675" y="4210346"/>
+                </a:cubicBezTo>
+                <a:lnTo>
+                  <a:pt x="0" y="4110472"/>
+                </a:lnTo>
+                <a:lnTo>
+                  <a:pt x="0" y="1290491"/>
+                </a:lnTo>
+                <a:lnTo>
+                  <a:pt x="60675" y="1190617"/>
+                </a:lnTo>
+                <a:cubicBezTo>
+                  <a:pt x="545971" y="472284"/>
+                  <a:pt x="1367810" y="0"/>
+                  <a:pt x="2299956" y="0"/>
+                </a:cubicBezTo>
+                <a:close/>
+              </a:path>
+            </a:pathLst>
+          </a:custGeom>
+          <a:solidFill>
+            <a:srgbClr val="FFFFFF"/>
+          </a:solidFill>
+          <a:ln>
+            <a:gradFill>
+              <a:gsLst>
+                <a:gs pos="0">
+                  <a:schemeClr val="accent6"/>
+                </a:gs>
+                <a:gs pos="23000">
+                  <a:schemeClr val="accent6"/>
+                </a:gs>
+                <a:gs pos="83000">
+                  <a:schemeClr val="accent1"/>
+                </a:gs>
+                <a:gs pos="100000">
+                  <a:schemeClr val="accent1"/>
+                </a:gs>
+              </a:gsLst>
+              <a:lin ang="5400000" scaled="1"/>
+            </a:gradFill>
+          </a:ln>
+        </p:spPr>
+        <p:style>
+          <a:lnRef idx="2">
+            <a:schemeClr val="accent1">
+              <a:shade val="50000"/>
+            </a:schemeClr>
+          </a:lnRef>
+          <a:fillRef idx="1">
+            <a:schemeClr val="accent1"/>
+          </a:fillRef>
+          <a:effectRef idx="0">
+            <a:schemeClr val="accent1"/>
+          </a:effectRef>
+          <a:fontRef idx="minor">
+            <a:schemeClr val="lt1"/>
+          </a:fontRef>
+        </p:style>
+        <p:txBody>
+          <a:bodyPr wrap="square" rtlCol="0" anchor="ctr">
+            <a:noAutofit/>
+          </a:bodyPr>
+          <a:lstStyle/>
+          <a:p>
+            <a:pPr algn="ctr"/>
+            <a:endParaRPr lang="en-US"/>
+          </a:p>
+        </p:txBody>
+      </p:sp>
+      <p:pic>
+        <p:nvPicPr>
+          <p:cNvPr id="39" name="Picture 38">
+            <a:extLst>
+              <a:ext uri="{FF2B5EF4-FFF2-40B4-BE49-F238E27FC236}">
+                <a16:creationId xmlns:a16="http://schemas.microsoft.com/office/drawing/2014/main" id="{8C497669-1ABC-4342-B470-6B35EE22D1DC}"/>
+              </a:ext>
+            </a:extLst>
+          </p:cNvPr>
+          <p:cNvPicPr>
+            <a:picLocks noChangeAspect="1"/>
+          </p:cNvPicPr>
+          <p:nvPr/>
+        </p:nvPicPr>
+        <p:blipFill>
+          <a:blip r:embed="rId3">
+            <a:extLst>
+              <a:ext uri="{28A0092B-C50C-407E-A947-70E740481C1C}">
+                <a14:useLocalDpi xmlns:a14="http://schemas.microsoft.com/office/drawing/2010/main" val="0"/>
+              </a:ext>
+            </a:extLst>
+          </a:blip>
+          <a:stretch>
+            <a:fillRect/>
+          </a:stretch>
+        </p:blipFill>
+        <p:spPr>
+          <a:xfrm>
+            <a:off x="2719195" y="2814539"/>
+            <a:ext cx="1659496" cy="2323295"/>
+          </a:xfrm>
+          <a:prstGeom prst="rect">
+            <a:avLst/>
+          </a:prstGeom>
+        </p:spPr>
+      </p:pic>
+      <p:sp>
+        <p:nvSpPr>
+          <p:cNvPr id="40" name="Content Placeholder 2">
+            <a:extLst>
+              <a:ext uri="{FF2B5EF4-FFF2-40B4-BE49-F238E27FC236}">
+                <a16:creationId xmlns:a16="http://schemas.microsoft.com/office/drawing/2014/main" id="{C621F049-B111-474B-9B41-ACC4F3AE34DE}"/>
+              </a:ext>
+            </a:extLst>
+          </p:cNvPr>
+          <p:cNvSpPr>
+            <a:spLocks noGrp="1"/>
+          </p:cNvSpPr>
+          <p:nvPr>
+            <p:ph idx="1"/>
+          </p:nvPr>
+        </p:nvSpPr>
+        <p:spPr>
+          <a:xfrm>
+            <a:off x="6090574" y="2421682"/>
+            <a:ext cx="4977578" cy="3639289"/>
+          </a:xfrm>
+        </p:spPr>
+        <p:txBody>
+          <a:bodyPr anchor="ctr">
+            <a:normAutofit fontScale="92500" lnSpcReduction="10000"/>
+          </a:bodyPr>
+          <a:lstStyle/>
+          <a:p>
+            <a:r>
+              <a:rPr lang="en-US" sz="2000" dirty="0">
+                <a:solidFill>
+                  <a:srgbClr val="000000"/>
+                </a:solidFill>
+              </a:rPr>
+              <a:t>AKA </a:t>
+            </a:r>
+            <a:r>
+              <a:rPr lang="en-US" sz="2000" dirty="0" err="1">
+                <a:solidFill>
+                  <a:srgbClr val="000000"/>
+                </a:solidFill>
+              </a:rPr>
+              <a:t>BigProf</a:t>
+            </a:r>
+            <a:r>
+              <a:rPr lang="en-US" sz="2000" dirty="0">
+                <a:solidFill>
+                  <a:srgbClr val="000000"/>
+                </a:solidFill>
+              </a:rPr>
+              <a:t> Software, </a:t>
+            </a:r>
+            <a:r>
+              <a:rPr lang="en-US" sz="2000" dirty="0">
+                <a:solidFill>
+                  <a:srgbClr val="000000"/>
+                </a:solidFill>
+                <a:hlinkClick r:id="rId4"/>
+              </a:rPr>
+              <a:t>bigprof.com</a:t>
+            </a:r>
+            <a:endParaRPr lang="en-US" sz="2000" dirty="0">
+              <a:solidFill>
+                <a:srgbClr val="000000"/>
+              </a:solidFill>
+            </a:endParaRPr>
+          </a:p>
+          <a:p>
+            <a:r>
+              <a:rPr lang="en-US" sz="2000" dirty="0">
+                <a:solidFill>
+                  <a:srgbClr val="000000"/>
+                </a:solidFill>
+              </a:rPr>
+              <a:t>Established since 2003.</a:t>
+            </a:r>
+          </a:p>
+          <a:p>
+            <a:r>
+              <a:rPr lang="en-US" sz="2000" dirty="0">
+                <a:solidFill>
+                  <a:srgbClr val="000000"/>
+                </a:solidFill>
+              </a:rPr>
+              <a:t>Developers of </a:t>
+            </a:r>
+            <a:r>
+              <a:rPr lang="en-US" sz="2000" dirty="0" err="1">
+                <a:solidFill>
+                  <a:srgbClr val="000000"/>
+                </a:solidFill>
+              </a:rPr>
+              <a:t>AppGini</a:t>
+            </a:r>
+            <a:r>
+              <a:rPr lang="en-US" sz="2000" dirty="0">
+                <a:solidFill>
+                  <a:srgbClr val="000000"/>
+                </a:solidFill>
+              </a:rPr>
+              <a:t>, one of the fastest and easiest tools for small businesses to create powerful web-based multi-user business applications, without writing any code.</a:t>
+            </a:r>
+          </a:p>
+          <a:p>
+            <a:r>
+              <a:rPr lang="en-US" sz="2000" dirty="0">
+                <a:solidFill>
+                  <a:srgbClr val="000000"/>
+                </a:solidFill>
+              </a:rPr>
+              <a:t>Over 100,000 users world-wide.</a:t>
+            </a:r>
+          </a:p>
+          <a:p>
+            <a:r>
+              <a:rPr lang="en-US" sz="2000" dirty="0">
+                <a:solidFill>
+                  <a:srgbClr val="000000"/>
+                </a:solidFill>
+              </a:rPr>
+              <a:t>We believe in open source, and in users having full control of their business tools.</a:t>
+            </a:r>
+          </a:p>
+          <a:p>
+            <a:r>
+              <a:rPr lang="en-US" sz="2000" dirty="0">
+                <a:solidFill>
+                  <a:srgbClr val="000000"/>
+                </a:solidFill>
+              </a:rPr>
+              <a:t>We recently launched a plugins market place to expand our tool set .. And you’re welcome to join!</a:t>
+            </a:r>
+          </a:p>
+        </p:txBody>
+      </p:sp>
+      <p:pic>
+        <p:nvPicPr>
+          <p:cNvPr id="6" name="Picture 5">
+            <a:extLst>
+              <a:ext uri="{FF2B5EF4-FFF2-40B4-BE49-F238E27FC236}">
+                <a16:creationId xmlns:a16="http://schemas.microsoft.com/office/drawing/2014/main" id="{C1E991F4-9F51-47F7-AA6E-7C137D2CA096}"/>
+              </a:ext>
+            </a:extLst>
+          </p:cNvPr>
+          <p:cNvPicPr>
+            <a:picLocks noChangeAspect="1"/>
+          </p:cNvPicPr>
+          <p:nvPr/>
+        </p:nvPicPr>
+        <p:blipFill>
+          <a:blip r:embed="rId5">
+            <a:duotone>
+              <a:schemeClr val="accent1">
+                <a:shade val="45000"/>
+                <a:satMod val="135000"/>
+              </a:schemeClr>
+              <a:prstClr val="white"/>
+            </a:duotone>
+            <a:extLst>
+              <a:ext uri="{28A0092B-C50C-407E-A947-70E740481C1C}">
+                <a14:useLocalDpi xmlns:a14="http://schemas.microsoft.com/office/drawing/2010/main" val="0"/>
+              </a:ext>
+            </a:extLst>
+          </a:blip>
+          <a:stretch>
+            <a:fillRect/>
+          </a:stretch>
+        </p:blipFill>
+        <p:spPr>
+          <a:xfrm>
+            <a:off x="506196" y="1429680"/>
+            <a:ext cx="3467539" cy="1723367"/>
+          </a:xfrm>
+          <a:prstGeom prst="rect">
+            <a:avLst/>
+          </a:prstGeom>
+          <a:ln>
+            <a:noFill/>
+          </a:ln>
+          <a:effectLst>
+            <a:outerShdw blurRad="292100" dist="139700" dir="2700000" algn="tl" rotWithShape="0">
+              <a:srgbClr val="333333">
+                <a:alpha val="65000"/>
+              </a:srgbClr>
+            </a:outerShdw>
+          </a:effectLst>
+        </p:spPr>
+      </p:pic>
+      <p:pic>
+        <p:nvPicPr>
+          <p:cNvPr id="42" name="Picture 41">
+            <a:extLst>
+              <a:ext uri="{FF2B5EF4-FFF2-40B4-BE49-F238E27FC236}">
+                <a16:creationId xmlns:a16="http://schemas.microsoft.com/office/drawing/2014/main" id="{ADDB2F36-787F-4340-8022-FF9D5F54DBE1}"/>
+              </a:ext>
+            </a:extLst>
+          </p:cNvPr>
+          <p:cNvPicPr>
+            <a:picLocks noChangeAspect="1"/>
+          </p:cNvPicPr>
+          <p:nvPr/>
+        </p:nvPicPr>
+        <p:blipFill rotWithShape="1">
+          <a:blip r:embed="rId6">
+            <a:extLst>
+              <a:ext uri="{28A0092B-C50C-407E-A947-70E740481C1C}">
+                <a14:useLocalDpi xmlns:a14="http://schemas.microsoft.com/office/drawing/2010/main" val="0"/>
+              </a:ext>
+            </a:extLst>
+          </a:blip>
+          <a:srcRect r="78358"/>
+          <a:stretch/>
+        </p:blipFill>
+        <p:spPr>
+          <a:xfrm>
+            <a:off x="449521" y="3293111"/>
+            <a:ext cx="1647927" cy="1366149"/>
+          </a:xfrm>
+          <a:prstGeom prst="rect">
+            <a:avLst/>
+          </a:prstGeom>
+        </p:spPr>
+      </p:pic>
+    </p:spTree>
+    <p:extLst>
+      <p:ext uri="{BB962C8B-B14F-4D97-AF65-F5344CB8AC3E}">
+        <p14:creationId xmlns:p14="http://schemas.microsoft.com/office/powerpoint/2010/main" val="74426438"/>
+      </p:ext>
+    </p:extLst>
+  </p:cSld>
+  <p:clrMapOvr>
+    <a:masterClrMapping/>
+  </p:clrMapOvr>
+</p:sld>
+</file>
+
+<file path=ppt/slides/slide20.xml><?xml version="1.0" encoding="utf-8"?>
 <p:sld xmlns:a="http://schemas.openxmlformats.org/drawingml/2006/main" xmlns:r="http://schemas.openxmlformats.org/officeDocument/2006/relationships" xmlns:p="http://schemas.openxmlformats.org/presentationml/2006/main">
   <p:cSld>
     <p:bg>
@@ -9495,7 +12167,7 @@
 </p:sld>
 </file>
 
-<file path=ppt/slides/slide19.xml><?xml version="1.0" encoding="utf-8"?>
+<file path=ppt/slides/slide21.xml><?xml version="1.0" encoding="utf-8"?>
 <p:sld xmlns:a="http://schemas.openxmlformats.org/drawingml/2006/main" xmlns:r="http://schemas.openxmlformats.org/officeDocument/2006/relationships" xmlns:p="http://schemas.openxmlformats.org/presentationml/2006/main">
   <p:cSld>
     <p:bg>
@@ -10084,629 +12756,7 @@
 </p:sld>
 </file>
 
-<file path=ppt/slides/slide2.xml><?xml version="1.0" encoding="utf-8"?>
-<p:sld xmlns:a="http://schemas.openxmlformats.org/drawingml/2006/main" xmlns:r="http://schemas.openxmlformats.org/officeDocument/2006/relationships" xmlns:p="http://schemas.openxmlformats.org/presentationml/2006/main">
-  <p:cSld>
-    <p:bg>
-      <p:bgPr>
-        <a:solidFill>
-          <a:schemeClr val="bg1"/>
-        </a:solidFill>
-        <a:effectLst/>
-      </p:bgPr>
-    </p:bg>
-    <p:spTree>
-      <p:nvGrpSpPr>
-        <p:cNvPr id="1" name=""/>
-        <p:cNvGrpSpPr/>
-        <p:nvPr/>
-      </p:nvGrpSpPr>
-      <p:grpSpPr>
-        <a:xfrm>
-          <a:off x="0" y="0"/>
-          <a:ext cx="0" cy="0"/>
-          <a:chOff x="0" y="0"/>
-          <a:chExt cx="0" cy="0"/>
-        </a:xfrm>
-      </p:grpSpPr>
-      <p:sp>
-        <p:nvSpPr>
-          <p:cNvPr id="10" name="Rectangle 9">
-            <a:extLst>
-              <a:ext uri="{FF2B5EF4-FFF2-40B4-BE49-F238E27FC236}">
-                <a16:creationId xmlns:a16="http://schemas.microsoft.com/office/drawing/2014/main" id="{AFA67CD3-AB4E-4A7A-BEB8-53C445D8C44E}"/>
-              </a:ext>
-              <a:ext uri="{C183D7F6-B498-43B3-948B-1728B52AA6E4}">
-                <adec:decorative xmlns:adec="http://schemas.microsoft.com/office/drawing/2017/decorative" val="1"/>
-              </a:ext>
-            </a:extLst>
-          </p:cNvPr>
-          <p:cNvSpPr>
-            <a:spLocks noGrp="1" noRot="1" noChangeAspect="1" noMove="1" noResize="1" noEditPoints="1" noAdjustHandles="1" noChangeArrowheads="1" noChangeShapeType="1" noTextEdit="1"/>
-          </p:cNvSpPr>
-          <p:nvPr>
-            <p:extLst>
-              <p:ext uri="{386F3935-93C4-4BCD-93E2-E3B085C9AB24}">
-                <p16:designElem xmlns:p16="http://schemas.microsoft.com/office/powerpoint/2015/main" val="1"/>
-              </p:ext>
-            </p:extLst>
-          </p:nvPr>
-        </p:nvSpPr>
-        <p:spPr>
-          <a:xfrm>
-            <a:off x="1" y="3726"/>
-            <a:ext cx="5614875" cy="6858000"/>
-          </a:xfrm>
-          <a:prstGeom prst="rect">
-            <a:avLst/>
-          </a:prstGeom>
-          <a:gradFill>
-            <a:gsLst>
-              <a:gs pos="0">
-                <a:schemeClr val="accent6"/>
-              </a:gs>
-              <a:gs pos="25000">
-                <a:schemeClr val="accent6"/>
-              </a:gs>
-              <a:gs pos="94000">
-                <a:schemeClr val="accent1"/>
-              </a:gs>
-              <a:gs pos="100000">
-                <a:schemeClr val="accent1"/>
-              </a:gs>
-            </a:gsLst>
-            <a:lin ang="4200000" scaled="0"/>
-          </a:gradFill>
-          <a:ln>
-            <a:noFill/>
-          </a:ln>
-        </p:spPr>
-        <p:style>
-          <a:lnRef idx="2">
-            <a:schemeClr val="accent1">
-              <a:shade val="50000"/>
-            </a:schemeClr>
-          </a:lnRef>
-          <a:fillRef idx="1">
-            <a:schemeClr val="accent1"/>
-          </a:fillRef>
-          <a:effectRef idx="0">
-            <a:schemeClr val="accent1"/>
-          </a:effectRef>
-          <a:fontRef idx="minor">
-            <a:schemeClr val="lt1"/>
-          </a:fontRef>
-        </p:style>
-        <p:txBody>
-          <a:bodyPr rtlCol="0" anchor="ctr"/>
-          <a:lstStyle/>
-          <a:p>
-            <a:pPr algn="ctr"/>
-            <a:endParaRPr lang="en-US"/>
-          </a:p>
-        </p:txBody>
-      </p:sp>
-      <p:pic>
-        <p:nvPicPr>
-          <p:cNvPr id="12" name="Picture 11">
-            <a:extLst>
-              <a:ext uri="{FF2B5EF4-FFF2-40B4-BE49-F238E27FC236}">
-                <a16:creationId xmlns:a16="http://schemas.microsoft.com/office/drawing/2014/main" id="{07CF545F-9C2E-4446-97CD-AD92990C2B68}"/>
-              </a:ext>
-              <a:ext uri="{C183D7F6-B498-43B3-948B-1728B52AA6E4}">
-                <adec:decorative xmlns:adec="http://schemas.microsoft.com/office/drawing/2017/decorative" val="1"/>
-              </a:ext>
-            </a:extLst>
-          </p:cNvPr>
-          <p:cNvPicPr>
-            <a:picLocks noGrp="1" noRot="1" noChangeAspect="1" noMove="1" noResize="1" noEditPoints="1" noAdjustHandles="1" noChangeArrowheads="1" noChangeShapeType="1" noCrop="1"/>
-          </p:cNvPicPr>
-          <p:nvPr>
-            <p:extLst>
-              <p:ext uri="{386F3935-93C4-4BCD-93E2-E3B085C9AB24}">
-                <p16:designElem xmlns:p16="http://schemas.microsoft.com/office/powerpoint/2015/main" val="1"/>
-              </p:ext>
-            </p:extLst>
-          </p:nvPr>
-        </p:nvPicPr>
-        <p:blipFill>
-          <a:blip r:embed="rId2">
-            <a:extLst>
-              <a:ext uri="{28A0092B-C50C-407E-A947-70E740481C1C}">
-                <a14:useLocalDpi xmlns:a14="http://schemas.microsoft.com/office/drawing/2010/main" val="0"/>
-              </a:ext>
-            </a:extLst>
-          </a:blip>
-          <a:stretch>
-            <a:fillRect/>
-          </a:stretch>
-        </p:blipFill>
-        <p:spPr>
-          <a:xfrm>
-            <a:off x="0" y="0"/>
-            <a:ext cx="12192000" cy="6858000"/>
-          </a:xfrm>
-          <a:prstGeom prst="rect">
-            <a:avLst/>
-          </a:prstGeom>
-        </p:spPr>
-      </p:pic>
-      <p:sp>
-        <p:nvSpPr>
-          <p:cNvPr id="2" name="Title 1">
-            <a:extLst>
-              <a:ext uri="{FF2B5EF4-FFF2-40B4-BE49-F238E27FC236}">
-                <a16:creationId xmlns:a16="http://schemas.microsoft.com/office/drawing/2014/main" id="{681BFD9F-8D2D-422B-B38B-9D170D11248E}"/>
-              </a:ext>
-            </a:extLst>
-          </p:cNvPr>
-          <p:cNvSpPr>
-            <a:spLocks noGrp="1"/>
-          </p:cNvSpPr>
-          <p:nvPr>
-            <p:ph type="title"/>
-          </p:nvPr>
-        </p:nvSpPr>
-        <p:spPr>
-          <a:xfrm>
-            <a:off x="6094105" y="802955"/>
-            <a:ext cx="4977976" cy="1454051"/>
-          </a:xfrm>
-        </p:spPr>
-        <p:txBody>
-          <a:bodyPr>
-            <a:normAutofit/>
-          </a:bodyPr>
-          <a:lstStyle/>
-          <a:p>
-            <a:r>
-              <a:rPr lang="en-US">
-                <a:solidFill>
-                  <a:srgbClr val="000000"/>
-                </a:solidFill>
-              </a:rPr>
-              <a:t>About Gene IT Solutions</a:t>
-            </a:r>
-          </a:p>
-        </p:txBody>
-      </p:sp>
-      <p:sp>
-        <p:nvSpPr>
-          <p:cNvPr id="14" name="Freeform 62">
-            <a:extLst>
-              <a:ext uri="{FF2B5EF4-FFF2-40B4-BE49-F238E27FC236}">
-                <a16:creationId xmlns:a16="http://schemas.microsoft.com/office/drawing/2014/main" id="{339C8D78-A644-462F-B674-F440635E5353}"/>
-              </a:ext>
-              <a:ext uri="{C183D7F6-B498-43B3-948B-1728B52AA6E4}">
-                <adec:decorative xmlns:adec="http://schemas.microsoft.com/office/drawing/2017/decorative" val="1"/>
-              </a:ext>
-            </a:extLst>
-          </p:cNvPr>
-          <p:cNvSpPr>
-            <a:spLocks noGrp="1" noRot="1" noChangeAspect="1" noMove="1" noResize="1" noEditPoints="1" noAdjustHandles="1" noChangeArrowheads="1" noChangeShapeType="1" noTextEdit="1"/>
-          </p:cNvSpPr>
-          <p:nvPr>
-            <p:extLst>
-              <p:ext uri="{386F3935-93C4-4BCD-93E2-E3B085C9AB24}">
-                <p16:designElem xmlns:p16="http://schemas.microsoft.com/office/powerpoint/2015/main" val="1"/>
-              </p:ext>
-            </p:extLst>
-          </p:nvPr>
-        </p:nvSpPr>
-        <p:spPr>
-          <a:xfrm>
-            <a:off x="0" y="738619"/>
-            <a:ext cx="5000438" cy="5400962"/>
-          </a:xfrm>
-          <a:custGeom>
-            <a:avLst/>
-            <a:gdLst>
-              <a:gd name="connsiteX0" fmla="*/ 2299956 w 5000438"/>
-              <a:gd name="connsiteY0" fmla="*/ 0 h 5400962"/>
-              <a:gd name="connsiteX1" fmla="*/ 5000438 w 5000438"/>
-              <a:gd name="connsiteY1" fmla="*/ 2700481 h 5400962"/>
-              <a:gd name="connsiteX2" fmla="*/ 2299956 w 5000438"/>
-              <a:gd name="connsiteY2" fmla="*/ 5400962 h 5400962"/>
-              <a:gd name="connsiteX3" fmla="*/ 60675 w 5000438"/>
-              <a:gd name="connsiteY3" fmla="*/ 4210346 h 5400962"/>
-              <a:gd name="connsiteX4" fmla="*/ 0 w 5000438"/>
-              <a:gd name="connsiteY4" fmla="*/ 4110472 h 5400962"/>
-              <a:gd name="connsiteX5" fmla="*/ 0 w 5000438"/>
-              <a:gd name="connsiteY5" fmla="*/ 1290491 h 5400962"/>
-              <a:gd name="connsiteX6" fmla="*/ 60675 w 5000438"/>
-              <a:gd name="connsiteY6" fmla="*/ 1190617 h 5400962"/>
-              <a:gd name="connsiteX7" fmla="*/ 2299956 w 5000438"/>
-              <a:gd name="connsiteY7" fmla="*/ 0 h 5400962"/>
-            </a:gdLst>
-            <a:ahLst/>
-            <a:cxnLst>
-              <a:cxn ang="0">
-                <a:pos x="connsiteX0" y="connsiteY0"/>
-              </a:cxn>
-              <a:cxn ang="0">
-                <a:pos x="connsiteX1" y="connsiteY1"/>
-              </a:cxn>
-              <a:cxn ang="0">
-                <a:pos x="connsiteX2" y="connsiteY2"/>
-              </a:cxn>
-              <a:cxn ang="0">
-                <a:pos x="connsiteX3" y="connsiteY3"/>
-              </a:cxn>
-              <a:cxn ang="0">
-                <a:pos x="connsiteX4" y="connsiteY4"/>
-              </a:cxn>
-              <a:cxn ang="0">
-                <a:pos x="connsiteX5" y="connsiteY5"/>
-              </a:cxn>
-              <a:cxn ang="0">
-                <a:pos x="connsiteX6" y="connsiteY6"/>
-              </a:cxn>
-              <a:cxn ang="0">
-                <a:pos x="connsiteX7" y="connsiteY7"/>
-              </a:cxn>
-            </a:cxnLst>
-            <a:rect l="l" t="t" r="r" b="b"/>
-            <a:pathLst>
-              <a:path w="5000438" h="5400962">
-                <a:moveTo>
-                  <a:pt x="2299956" y="0"/>
-                </a:moveTo>
-                <a:cubicBezTo>
-                  <a:pt x="3791390" y="0"/>
-                  <a:pt x="5000438" y="1209047"/>
-                  <a:pt x="5000438" y="2700481"/>
-                </a:cubicBezTo>
-                <a:cubicBezTo>
-                  <a:pt x="5000438" y="4191915"/>
-                  <a:pt x="3791390" y="5400962"/>
-                  <a:pt x="2299956" y="5400962"/>
-                </a:cubicBezTo>
-                <a:cubicBezTo>
-                  <a:pt x="1367810" y="5400962"/>
-                  <a:pt x="545971" y="4928678"/>
-                  <a:pt x="60675" y="4210346"/>
-                </a:cubicBezTo>
-                <a:lnTo>
-                  <a:pt x="0" y="4110472"/>
-                </a:lnTo>
-                <a:lnTo>
-                  <a:pt x="0" y="1290491"/>
-                </a:lnTo>
-                <a:lnTo>
-                  <a:pt x="60675" y="1190617"/>
-                </a:lnTo>
-                <a:cubicBezTo>
-                  <a:pt x="545971" y="472284"/>
-                  <a:pt x="1367810" y="0"/>
-                  <a:pt x="2299956" y="0"/>
-                </a:cubicBezTo>
-                <a:close/>
-              </a:path>
-            </a:pathLst>
-          </a:custGeom>
-          <a:solidFill>
-            <a:srgbClr val="FFFFFF"/>
-          </a:solidFill>
-          <a:ln>
-            <a:gradFill>
-              <a:gsLst>
-                <a:gs pos="0">
-                  <a:schemeClr val="accent6"/>
-                </a:gs>
-                <a:gs pos="23000">
-                  <a:schemeClr val="accent6"/>
-                </a:gs>
-                <a:gs pos="83000">
-                  <a:schemeClr val="accent1"/>
-                </a:gs>
-                <a:gs pos="100000">
-                  <a:schemeClr val="accent1"/>
-                </a:gs>
-              </a:gsLst>
-              <a:lin ang="5400000" scaled="1"/>
-            </a:gradFill>
-          </a:ln>
-        </p:spPr>
-        <p:style>
-          <a:lnRef idx="2">
-            <a:schemeClr val="accent1">
-              <a:shade val="50000"/>
-            </a:schemeClr>
-          </a:lnRef>
-          <a:fillRef idx="1">
-            <a:schemeClr val="accent1"/>
-          </a:fillRef>
-          <a:effectRef idx="0">
-            <a:schemeClr val="accent1"/>
-          </a:effectRef>
-          <a:fontRef idx="minor">
-            <a:schemeClr val="lt1"/>
-          </a:fontRef>
-        </p:style>
-        <p:txBody>
-          <a:bodyPr wrap="square" rtlCol="0" anchor="ctr">
-            <a:noAutofit/>
-          </a:bodyPr>
-          <a:lstStyle/>
-          <a:p>
-            <a:pPr algn="ctr"/>
-            <a:endParaRPr lang="en-US"/>
-          </a:p>
-        </p:txBody>
-      </p:sp>
-      <p:pic>
-        <p:nvPicPr>
-          <p:cNvPr id="39" name="Picture 38">
-            <a:extLst>
-              <a:ext uri="{FF2B5EF4-FFF2-40B4-BE49-F238E27FC236}">
-                <a16:creationId xmlns:a16="http://schemas.microsoft.com/office/drawing/2014/main" id="{8C497669-1ABC-4342-B470-6B35EE22D1DC}"/>
-              </a:ext>
-            </a:extLst>
-          </p:cNvPr>
-          <p:cNvPicPr>
-            <a:picLocks noChangeAspect="1"/>
-          </p:cNvPicPr>
-          <p:nvPr/>
-        </p:nvPicPr>
-        <p:blipFill>
-          <a:blip r:embed="rId3">
-            <a:extLst>
-              <a:ext uri="{28A0092B-C50C-407E-A947-70E740481C1C}">
-                <a14:useLocalDpi xmlns:a14="http://schemas.microsoft.com/office/drawing/2010/main" val="0"/>
-              </a:ext>
-            </a:extLst>
-          </a:blip>
-          <a:stretch>
-            <a:fillRect/>
-          </a:stretch>
-        </p:blipFill>
-        <p:spPr>
-          <a:xfrm>
-            <a:off x="2719195" y="2814539"/>
-            <a:ext cx="1659496" cy="2323295"/>
-          </a:xfrm>
-          <a:prstGeom prst="rect">
-            <a:avLst/>
-          </a:prstGeom>
-        </p:spPr>
-      </p:pic>
-      <p:sp>
-        <p:nvSpPr>
-          <p:cNvPr id="40" name="Content Placeholder 2">
-            <a:extLst>
-              <a:ext uri="{FF2B5EF4-FFF2-40B4-BE49-F238E27FC236}">
-                <a16:creationId xmlns:a16="http://schemas.microsoft.com/office/drawing/2014/main" id="{C621F049-B111-474B-9B41-ACC4F3AE34DE}"/>
-              </a:ext>
-            </a:extLst>
-          </p:cNvPr>
-          <p:cNvSpPr>
-            <a:spLocks noGrp="1"/>
-          </p:cNvSpPr>
-          <p:nvPr>
-            <p:ph idx="1"/>
-          </p:nvPr>
-        </p:nvSpPr>
-        <p:spPr>
-          <a:xfrm>
-            <a:off x="6090574" y="2421682"/>
-            <a:ext cx="4977578" cy="3639289"/>
-          </a:xfrm>
-        </p:spPr>
-        <p:txBody>
-          <a:bodyPr anchor="ctr">
-            <a:normAutofit fontScale="92500" lnSpcReduction="10000"/>
-          </a:bodyPr>
-          <a:lstStyle/>
-          <a:p>
-            <a:r>
-              <a:rPr lang="en-US" sz="2000" dirty="0">
-                <a:solidFill>
-                  <a:srgbClr val="000000"/>
-                </a:solidFill>
-              </a:rPr>
-              <a:t>AKA </a:t>
-            </a:r>
-            <a:r>
-              <a:rPr lang="en-US" sz="2000" dirty="0" err="1">
-                <a:solidFill>
-                  <a:srgbClr val="000000"/>
-                </a:solidFill>
-              </a:rPr>
-              <a:t>BigProf</a:t>
-            </a:r>
-            <a:r>
-              <a:rPr lang="en-US" sz="2000" dirty="0">
-                <a:solidFill>
-                  <a:srgbClr val="000000"/>
-                </a:solidFill>
-              </a:rPr>
-              <a:t> Software, </a:t>
-            </a:r>
-            <a:r>
-              <a:rPr lang="en-US" sz="2000" dirty="0">
-                <a:solidFill>
-                  <a:srgbClr val="000000"/>
-                </a:solidFill>
-                <a:hlinkClick r:id="rId4"/>
-              </a:rPr>
-              <a:t>bigprof.com</a:t>
-            </a:r>
-            <a:endParaRPr lang="en-US" sz="2000" dirty="0">
-              <a:solidFill>
-                <a:srgbClr val="000000"/>
-              </a:solidFill>
-            </a:endParaRPr>
-          </a:p>
-          <a:p>
-            <a:r>
-              <a:rPr lang="en-US" sz="2000" dirty="0">
-                <a:solidFill>
-                  <a:srgbClr val="000000"/>
-                </a:solidFill>
-              </a:rPr>
-              <a:t>Established since 2003.</a:t>
-            </a:r>
-          </a:p>
-          <a:p>
-            <a:r>
-              <a:rPr lang="en-US" sz="2000" dirty="0">
-                <a:solidFill>
-                  <a:srgbClr val="000000"/>
-                </a:solidFill>
-              </a:rPr>
-              <a:t>Developers of </a:t>
-            </a:r>
-            <a:r>
-              <a:rPr lang="en-US" sz="2000" dirty="0" err="1">
-                <a:solidFill>
-                  <a:srgbClr val="000000"/>
-                </a:solidFill>
-              </a:rPr>
-              <a:t>AppGini</a:t>
-            </a:r>
-            <a:r>
-              <a:rPr lang="en-US" sz="2000" dirty="0">
-                <a:solidFill>
-                  <a:srgbClr val="000000"/>
-                </a:solidFill>
-              </a:rPr>
-              <a:t>, one of the fastest and easiest tools for small businesses to create powerful web-based multi-user business applications, without writing any code.</a:t>
-            </a:r>
-          </a:p>
-          <a:p>
-            <a:r>
-              <a:rPr lang="en-US" sz="2000" dirty="0">
-                <a:solidFill>
-                  <a:srgbClr val="000000"/>
-                </a:solidFill>
-              </a:rPr>
-              <a:t>Over 100,000 users world-wide.</a:t>
-            </a:r>
-          </a:p>
-          <a:p>
-            <a:r>
-              <a:rPr lang="en-US" sz="2000" dirty="0">
-                <a:solidFill>
-                  <a:srgbClr val="000000"/>
-                </a:solidFill>
-              </a:rPr>
-              <a:t>We believe in open source, and in users having full control of their business tools.</a:t>
-            </a:r>
-          </a:p>
-          <a:p>
-            <a:r>
-              <a:rPr lang="en-US" sz="2000" dirty="0">
-                <a:solidFill>
-                  <a:srgbClr val="000000"/>
-                </a:solidFill>
-              </a:rPr>
-              <a:t>We recently launched a plugins market place to expand our tool set .. And you’re welcome to join!</a:t>
-            </a:r>
-          </a:p>
-        </p:txBody>
-      </p:sp>
-      <p:pic>
-        <p:nvPicPr>
-          <p:cNvPr id="6" name="Picture 5">
-            <a:extLst>
-              <a:ext uri="{FF2B5EF4-FFF2-40B4-BE49-F238E27FC236}">
-                <a16:creationId xmlns:a16="http://schemas.microsoft.com/office/drawing/2014/main" id="{C1E991F4-9F51-47F7-AA6E-7C137D2CA096}"/>
-              </a:ext>
-            </a:extLst>
-          </p:cNvPr>
-          <p:cNvPicPr>
-            <a:picLocks noChangeAspect="1"/>
-          </p:cNvPicPr>
-          <p:nvPr/>
-        </p:nvPicPr>
-        <p:blipFill>
-          <a:blip r:embed="rId5">
-            <a:duotone>
-              <a:schemeClr val="accent1">
-                <a:shade val="45000"/>
-                <a:satMod val="135000"/>
-              </a:schemeClr>
-              <a:prstClr val="white"/>
-            </a:duotone>
-            <a:extLst>
-              <a:ext uri="{28A0092B-C50C-407E-A947-70E740481C1C}">
-                <a14:useLocalDpi xmlns:a14="http://schemas.microsoft.com/office/drawing/2010/main" val="0"/>
-              </a:ext>
-            </a:extLst>
-          </a:blip>
-          <a:stretch>
-            <a:fillRect/>
-          </a:stretch>
-        </p:blipFill>
-        <p:spPr>
-          <a:xfrm>
-            <a:off x="506196" y="1429680"/>
-            <a:ext cx="3467539" cy="1723367"/>
-          </a:xfrm>
-          <a:prstGeom prst="rect">
-            <a:avLst/>
-          </a:prstGeom>
-          <a:ln>
-            <a:noFill/>
-          </a:ln>
-          <a:effectLst>
-            <a:outerShdw blurRad="292100" dist="139700" dir="2700000" algn="tl" rotWithShape="0">
-              <a:srgbClr val="333333">
-                <a:alpha val="65000"/>
-              </a:srgbClr>
-            </a:outerShdw>
-          </a:effectLst>
-        </p:spPr>
-      </p:pic>
-      <p:pic>
-        <p:nvPicPr>
-          <p:cNvPr id="42" name="Picture 41">
-            <a:extLst>
-              <a:ext uri="{FF2B5EF4-FFF2-40B4-BE49-F238E27FC236}">
-                <a16:creationId xmlns:a16="http://schemas.microsoft.com/office/drawing/2014/main" id="{ADDB2F36-787F-4340-8022-FF9D5F54DBE1}"/>
-              </a:ext>
-            </a:extLst>
-          </p:cNvPr>
-          <p:cNvPicPr>
-            <a:picLocks noChangeAspect="1"/>
-          </p:cNvPicPr>
-          <p:nvPr/>
-        </p:nvPicPr>
-        <p:blipFill rotWithShape="1">
-          <a:blip r:embed="rId6">
-            <a:extLst>
-              <a:ext uri="{28A0092B-C50C-407E-A947-70E740481C1C}">
-                <a14:useLocalDpi xmlns:a14="http://schemas.microsoft.com/office/drawing/2010/main" val="0"/>
-              </a:ext>
-            </a:extLst>
-          </a:blip>
-          <a:srcRect r="78358"/>
-          <a:stretch/>
-        </p:blipFill>
-        <p:spPr>
-          <a:xfrm>
-            <a:off x="449521" y="3293111"/>
-            <a:ext cx="1647927" cy="1366149"/>
-          </a:xfrm>
-          <a:prstGeom prst="rect">
-            <a:avLst/>
-          </a:prstGeom>
-        </p:spPr>
-      </p:pic>
-    </p:spTree>
-    <p:extLst>
-      <p:ext uri="{BB962C8B-B14F-4D97-AF65-F5344CB8AC3E}">
-        <p14:creationId xmlns:p14="http://schemas.microsoft.com/office/powerpoint/2010/main" val="74426438"/>
-      </p:ext>
-    </p:extLst>
-  </p:cSld>
-  <p:clrMapOvr>
-    <a:masterClrMapping/>
-  </p:clrMapOvr>
-</p:sld>
-</file>
-
-<file path=ppt/slides/slide20.xml><?xml version="1.0" encoding="utf-8"?>
+<file path=ppt/slides/slide22.xml><?xml version="1.0" encoding="utf-8"?>
 <p:sld xmlns:a="http://schemas.openxmlformats.org/drawingml/2006/main" xmlns:r="http://schemas.openxmlformats.org/officeDocument/2006/relationships" xmlns:p="http://schemas.openxmlformats.org/presentationml/2006/main">
   <p:cSld>
     <p:bg>
@@ -10954,7 +13004,7 @@
 </p:sld>
 </file>
 
-<file path=ppt/slides/slide21.xml><?xml version="1.0" encoding="utf-8"?>
+<file path=ppt/slides/slide23.xml><?xml version="1.0" encoding="utf-8"?>
 <p:sld xmlns:a="http://schemas.openxmlformats.org/drawingml/2006/main" xmlns:r="http://schemas.openxmlformats.org/officeDocument/2006/relationships" xmlns:p="http://schemas.openxmlformats.org/presentationml/2006/main">
   <p:cSld>
     <p:bg>
@@ -11208,7 +13258,7 @@
 </p:sld>
 </file>
 
-<file path=ppt/slides/slide22.xml><?xml version="1.0" encoding="utf-8"?>
+<file path=ppt/slides/slide24.xml><?xml version="1.0" encoding="utf-8"?>
 <p:sld xmlns:a="http://schemas.openxmlformats.org/drawingml/2006/main" xmlns:r="http://schemas.openxmlformats.org/officeDocument/2006/relationships" xmlns:p="http://schemas.openxmlformats.org/presentationml/2006/main">
   <p:cSld>
     <p:bg>

</xml_diff>